<commit_message>
update slides 11 may
new architecture diagram slide 9
</commit_message>
<xml_diff>
--- a/wot-11may16.pptx
+++ b/wot-11may16.pptx
@@ -13,7 +13,7 @@
     <p:sldId id="260" r:id="rId7"/>
     <p:sldId id="261" r:id="rId8"/>
     <p:sldId id="262" r:id="rId9"/>
-    <p:sldId id="278" r:id="rId10"/>
+    <p:sldId id="280" r:id="rId10"/>
     <p:sldId id="277" r:id="rId11"/>
     <p:sldId id="279" r:id="rId12"/>
   </p:sldIdLst>
@@ -6661,52 +6661,6 @@
       </p:grpSpPr>
       <p:sp>
         <p:nvSpPr>
-          <p:cNvPr id="35" name="Cloud 34"/>
-          <p:cNvSpPr/>
-          <p:nvPr/>
-        </p:nvSpPr>
-        <p:spPr>
-          <a:xfrm>
-            <a:off x="6233883" y="2703004"/>
-            <a:ext cx="1421558" cy="1409758"/>
-          </a:xfrm>
-          <a:prstGeom prst="cloud">
-            <a:avLst/>
-          </a:prstGeom>
-          <a:solidFill>
-            <a:srgbClr val="FFFFFF"/>
-          </a:solidFill>
-          <a:ln>
-            <a:solidFill>
-              <a:srgbClr val="000000"/>
-            </a:solidFill>
-          </a:ln>
-        </p:spPr>
-        <p:style>
-          <a:lnRef idx="1">
-            <a:schemeClr val="accent1"/>
-          </a:lnRef>
-          <a:fillRef idx="3">
-            <a:schemeClr val="accent1"/>
-          </a:fillRef>
-          <a:effectRef idx="2">
-            <a:schemeClr val="accent1"/>
-          </a:effectRef>
-          <a:fontRef idx="minor">
-            <a:schemeClr val="lt1"/>
-          </a:fontRef>
-        </p:style>
-        <p:txBody>
-          <a:bodyPr rtlCol="0" anchor="ctr"/>
-          <a:lstStyle/>
-          <a:p>
-            <a:pPr algn="ctr"/>
-            <a:endParaRPr lang="en-US"/>
-          </a:p>
-        </p:txBody>
-      </p:sp>
-      <p:sp>
-        <p:nvSpPr>
           <p:cNvPr id="2" name="Title 1"/>
           <p:cNvSpPr>
             <a:spLocks noGrp="1"/>
@@ -6735,8 +6689,8 @@
         </p:nvSpPr>
         <p:spPr>
           <a:xfrm>
-            <a:off x="1692313" y="3084911"/>
-            <a:ext cx="3656010" cy="571751"/>
+            <a:off x="1002080" y="2747892"/>
+            <a:ext cx="4610873" cy="429368"/>
           </a:xfrm>
           <a:prstGeom prst="rect">
             <a:avLst/>
@@ -6778,7 +6732,7 @@
                   <a:srgbClr val="000000"/>
                 </a:solidFill>
               </a:rPr>
-              <a:t>Resource Layer + Transfer Layer</a:t>
+              <a:t>Abstract Transfer Layer</a:t>
             </a:r>
           </a:p>
         </p:txBody>
@@ -6791,13 +6745,18 @@
         </p:nvSpPr>
         <p:spPr>
           <a:xfrm>
-            <a:off x="1692313" y="2421749"/>
-            <a:ext cx="3656009" cy="454304"/>
+            <a:off x="1002080" y="2281937"/>
+            <a:ext cx="4610873" cy="454304"/>
           </a:xfrm>
           <a:prstGeom prst="rect">
             <a:avLst/>
           </a:prstGeom>
-          <a:noFill/>
+          <a:solidFill>
+            <a:schemeClr val="accent6">
+              <a:lumMod val="40000"/>
+              <a:lumOff val="60000"/>
+            </a:schemeClr>
+          </a:solidFill>
           <a:ln>
             <a:solidFill>
               <a:schemeClr val="tx1"/>
@@ -6829,7 +6788,7 @@
                   <a:srgbClr val="000000"/>
                 </a:solidFill>
               </a:rPr>
-              <a:t>Protocols: HTTP, CoAP, MQTT</a:t>
+              <a:t>Common Resource Layer</a:t>
             </a:r>
           </a:p>
         </p:txBody>
@@ -6842,13 +6801,15 @@
         </p:nvSpPr>
         <p:spPr>
           <a:xfrm>
-            <a:off x="1692313" y="3844095"/>
-            <a:ext cx="3656010" cy="454304"/>
+            <a:off x="3467125" y="3610462"/>
+            <a:ext cx="1053900" cy="454304"/>
           </a:xfrm>
           <a:prstGeom prst="rect">
             <a:avLst/>
           </a:prstGeom>
-          <a:noFill/>
+          <a:solidFill>
+            <a:srgbClr val="FCD5B5"/>
+          </a:solidFill>
           <a:ln>
             <a:solidFill>
               <a:schemeClr val="tx1"/>
@@ -6880,20 +6841,20 @@
                   <a:srgbClr val="000000"/>
                 </a:solidFill>
               </a:rPr>
-              <a:t>Applications and Handlers</a:t>
-            </a:r>
-          </a:p>
-        </p:txBody>
-      </p:sp>
-      <p:sp>
-        <p:nvSpPr>
-          <p:cNvPr id="15" name="Can 14"/>
+              <a:t>Protocols</a:t>
+            </a:r>
+          </a:p>
+        </p:txBody>
+      </p:sp>
+      <p:sp>
+        <p:nvSpPr>
+          <p:cNvPr id="16" name="Can 15"/>
           <p:cNvSpPr/>
           <p:nvPr/>
         </p:nvSpPr>
         <p:spPr>
           <a:xfrm>
-            <a:off x="6525186" y="2980911"/>
+            <a:off x="1209547" y="4429039"/>
             <a:ext cx="745736" cy="780609"/>
           </a:xfrm>
           <a:prstGeom prst="can">
@@ -6931,57 +6892,13 @@
       </p:sp>
       <p:sp>
         <p:nvSpPr>
-          <p:cNvPr id="16" name="Can 15"/>
-          <p:cNvSpPr/>
-          <p:nvPr/>
-        </p:nvSpPr>
-        <p:spPr>
-          <a:xfrm>
-            <a:off x="4312206" y="4734918"/>
-            <a:ext cx="745736" cy="780609"/>
-          </a:xfrm>
-          <a:prstGeom prst="can">
-            <a:avLst/>
-          </a:prstGeom>
-          <a:noFill/>
-          <a:ln>
-            <a:solidFill>
-              <a:srgbClr val="000000"/>
-            </a:solidFill>
-          </a:ln>
-        </p:spPr>
-        <p:style>
-          <a:lnRef idx="1">
-            <a:schemeClr val="accent1"/>
-          </a:lnRef>
-          <a:fillRef idx="3">
-            <a:schemeClr val="accent1"/>
-          </a:fillRef>
-          <a:effectRef idx="2">
-            <a:schemeClr val="accent1"/>
-          </a:effectRef>
-          <a:fontRef idx="minor">
-            <a:schemeClr val="lt1"/>
-          </a:fontRef>
-        </p:style>
-        <p:txBody>
-          <a:bodyPr rtlCol="0" anchor="ctr"/>
-          <a:lstStyle/>
-          <a:p>
-            <a:pPr algn="ctr"/>
-            <a:endParaRPr lang="en-US"/>
-          </a:p>
-        </p:txBody>
-      </p:sp>
-      <p:sp>
-        <p:nvSpPr>
           <p:cNvPr id="17" name="Oval 16"/>
           <p:cNvSpPr/>
           <p:nvPr/>
         </p:nvSpPr>
         <p:spPr>
           <a:xfrm>
-            <a:off x="1692313" y="4928320"/>
+            <a:off x="2141232" y="4531872"/>
             <a:ext cx="370112" cy="372052"/>
           </a:xfrm>
           <a:prstGeom prst="ellipse">
@@ -7027,7 +6944,7 @@
         </p:nvSpPr>
         <p:spPr>
           <a:xfrm>
-            <a:off x="2322449" y="5149299"/>
+            <a:off x="2479604" y="4862604"/>
             <a:ext cx="370112" cy="372052"/>
           </a:xfrm>
           <a:prstGeom prst="ellipse">
@@ -7073,7 +6990,7 @@
         </p:nvSpPr>
         <p:spPr>
           <a:xfrm>
-            <a:off x="3080759" y="4963273"/>
+            <a:off x="2876781" y="4622512"/>
             <a:ext cx="370112" cy="372052"/>
           </a:xfrm>
           <a:prstGeom prst="ellipse">
@@ -7114,15 +7031,13 @@
       <p:cxnSp>
         <p:nvCxnSpPr>
           <p:cNvPr id="21" name="Straight Arrow Connector 20"/>
-          <p:cNvCxnSpPr>
-            <a:endCxn id="17" idx="7"/>
-          </p:cNvCxnSpPr>
+          <p:cNvCxnSpPr/>
           <p:nvPr/>
         </p:nvCxnSpPr>
         <p:spPr>
           <a:xfrm flipH="1">
-            <a:off x="2008223" y="4278866"/>
-            <a:ext cx="499282" cy="703940"/>
+            <a:off x="2413411" y="4071247"/>
+            <a:ext cx="195866" cy="498408"/>
           </a:xfrm>
           <a:prstGeom prst="straightConnector1">
             <a:avLst/>
@@ -7154,14 +7069,15 @@
         <p:nvCxnSpPr>
           <p:cNvPr id="22" name="Straight Arrow Connector 21"/>
           <p:cNvCxnSpPr>
+            <a:stCxn id="24" idx="2"/>
             <a:endCxn id="18" idx="0"/>
           </p:cNvCxnSpPr>
           <p:nvPr/>
         </p:nvCxnSpPr>
         <p:spPr>
           <a:xfrm flipH="1">
-            <a:off x="2507505" y="4298399"/>
-            <a:ext cx="185056" cy="850900"/>
+            <a:off x="2664660" y="4071247"/>
+            <a:ext cx="149329" cy="791357"/>
           </a:xfrm>
           <a:prstGeom prst="straightConnector1">
             <a:avLst/>
@@ -7192,13 +7108,15 @@
       <p:cxnSp>
         <p:nvCxnSpPr>
           <p:cNvPr id="25" name="Straight Arrow Connector 24"/>
-          <p:cNvCxnSpPr/>
+          <p:cNvCxnSpPr>
+            <a:endCxn id="19" idx="0"/>
+          </p:cNvCxnSpPr>
           <p:nvPr/>
         </p:nvCxnSpPr>
         <p:spPr>
           <a:xfrm>
-            <a:off x="2905524" y="4298399"/>
-            <a:ext cx="291756" cy="684407"/>
+            <a:off x="2971293" y="4075601"/>
+            <a:ext cx="90544" cy="546911"/>
           </a:xfrm>
           <a:prstGeom prst="straightConnector1">
             <a:avLst/>
@@ -7234,8 +7152,8 @@
         </p:nvCxnSpPr>
         <p:spPr>
           <a:xfrm>
-            <a:off x="4685074" y="4278866"/>
-            <a:ext cx="0" cy="474694"/>
+            <a:off x="1582415" y="4054544"/>
+            <a:ext cx="0" cy="372791"/>
           </a:xfrm>
           <a:prstGeom prst="straightConnector1">
             <a:avLst/>
@@ -7263,144 +7181,6 @@
           </a:fontRef>
         </p:style>
       </p:cxnSp>
-      <p:cxnSp>
-        <p:nvCxnSpPr>
-          <p:cNvPr id="31" name="Straight Arrow Connector 30"/>
-          <p:cNvCxnSpPr>
-            <a:endCxn id="15" idx="2"/>
-          </p:cNvCxnSpPr>
-          <p:nvPr/>
-        </p:nvCxnSpPr>
-        <p:spPr>
-          <a:xfrm>
-            <a:off x="5348323" y="3346019"/>
-            <a:ext cx="1176863" cy="25197"/>
-          </a:xfrm>
-          <a:prstGeom prst="straightConnector1">
-            <a:avLst/>
-          </a:prstGeom>
-          <a:ln>
-            <a:solidFill>
-              <a:srgbClr val="000000"/>
-            </a:solidFill>
-            <a:headEnd type="arrow"/>
-            <a:tailEnd type="arrow"/>
-          </a:ln>
-        </p:spPr>
-        <p:style>
-          <a:lnRef idx="2">
-            <a:schemeClr val="accent1"/>
-          </a:lnRef>
-          <a:fillRef idx="0">
-            <a:schemeClr val="accent1"/>
-          </a:fillRef>
-          <a:effectRef idx="1">
-            <a:schemeClr val="accent1"/>
-          </a:effectRef>
-          <a:fontRef idx="minor">
-            <a:schemeClr val="tx1"/>
-          </a:fontRef>
-        </p:style>
-      </p:cxnSp>
-      <p:sp>
-        <p:nvSpPr>
-          <p:cNvPr id="36" name="Rectangle 35"/>
-          <p:cNvSpPr/>
-          <p:nvPr/>
-        </p:nvSpPr>
-        <p:spPr>
-          <a:xfrm>
-            <a:off x="5872668" y="4139056"/>
-            <a:ext cx="2157562" cy="369332"/>
-          </a:xfrm>
-          <a:prstGeom prst="rect">
-            <a:avLst/>
-          </a:prstGeom>
-        </p:spPr>
-        <p:txBody>
-          <a:bodyPr wrap="none">
-            <a:spAutoFit/>
-          </a:bodyPr>
-          <a:lstStyle/>
-          <a:p>
-            <a:r>
-              <a:rPr lang="en-US">
-                <a:solidFill>
-                  <a:srgbClr val="000000"/>
-                </a:solidFill>
-              </a:rPr>
-              <a:t>Semantic Annotation</a:t>
-            </a:r>
-            <a:endParaRPr lang="en-US"/>
-          </a:p>
-        </p:txBody>
-      </p:sp>
-      <p:sp>
-        <p:nvSpPr>
-          <p:cNvPr id="37" name="Rectangle 36"/>
-          <p:cNvSpPr/>
-          <p:nvPr/>
-        </p:nvSpPr>
-        <p:spPr>
-          <a:xfrm>
-            <a:off x="4232910" y="5480574"/>
-            <a:ext cx="904327" cy="369332"/>
-          </a:xfrm>
-          <a:prstGeom prst="rect">
-            <a:avLst/>
-          </a:prstGeom>
-        </p:spPr>
-        <p:txBody>
-          <a:bodyPr wrap="none">
-            <a:spAutoFit/>
-          </a:bodyPr>
-          <a:lstStyle/>
-          <a:p>
-            <a:r>
-              <a:rPr lang="en-US">
-                <a:solidFill>
-                  <a:srgbClr val="000000"/>
-                </a:solidFill>
-              </a:rPr>
-              <a:t>Storage</a:t>
-            </a:r>
-            <a:endParaRPr lang="en-US"/>
-          </a:p>
-        </p:txBody>
-      </p:sp>
-      <p:sp>
-        <p:nvSpPr>
-          <p:cNvPr id="38" name="Rectangle 37"/>
-          <p:cNvSpPr/>
-          <p:nvPr/>
-        </p:nvSpPr>
-        <p:spPr>
-          <a:xfrm>
-            <a:off x="2721194" y="5359791"/>
-            <a:ext cx="791615" cy="369332"/>
-          </a:xfrm>
-          <a:prstGeom prst="rect">
-            <a:avLst/>
-          </a:prstGeom>
-        </p:spPr>
-        <p:txBody>
-          <a:bodyPr wrap="none">
-            <a:spAutoFit/>
-          </a:bodyPr>
-          <a:lstStyle/>
-          <a:p>
-            <a:r>
-              <a:rPr lang="en-US">
-                <a:solidFill>
-                  <a:srgbClr val="000000"/>
-                </a:solidFill>
-              </a:rPr>
-              <a:t>Things</a:t>
-            </a:r>
-            <a:endParaRPr lang="en-US"/>
-          </a:p>
-        </p:txBody>
-      </p:sp>
       <p:sp>
         <p:nvSpPr>
           <p:cNvPr id="42" name="Cloud 41"/>
@@ -7409,8 +7189,8 @@
         </p:nvSpPr>
         <p:spPr>
           <a:xfrm>
-            <a:off x="1449009" y="1546736"/>
-            <a:ext cx="4167311" cy="779671"/>
+            <a:off x="3355812" y="4318818"/>
+            <a:ext cx="1265795" cy="1168745"/>
           </a:xfrm>
           <a:prstGeom prst="cloud">
             <a:avLst/>
@@ -7443,6 +7223,617 @@
           <a:lstStyle/>
           <a:p>
             <a:pPr algn="ctr"/>
+            <a:r>
+              <a:rPr lang="en-US">
+                <a:solidFill>
+                  <a:srgbClr val="000000"/>
+                </a:solidFill>
+              </a:rPr>
+              <a:t>HTTP, CoAP, MQTT</a:t>
+            </a:r>
+          </a:p>
+        </p:txBody>
+      </p:sp>
+      <p:sp>
+        <p:nvSpPr>
+          <p:cNvPr id="24" name="Rectangle 23"/>
+          <p:cNvSpPr/>
+          <p:nvPr/>
+        </p:nvSpPr>
+        <p:spPr>
+          <a:xfrm>
+            <a:off x="2272165" y="3616943"/>
+            <a:ext cx="1083647" cy="454304"/>
+          </a:xfrm>
+          <a:prstGeom prst="rect">
+            <a:avLst/>
+          </a:prstGeom>
+          <a:noFill/>
+          <a:ln>
+            <a:solidFill>
+              <a:schemeClr val="tx1"/>
+            </a:solidFill>
+          </a:ln>
+        </p:spPr>
+        <p:style>
+          <a:lnRef idx="1">
+            <a:schemeClr val="accent1"/>
+          </a:lnRef>
+          <a:fillRef idx="3">
+            <a:schemeClr val="accent1"/>
+          </a:fillRef>
+          <a:effectRef idx="2">
+            <a:schemeClr val="accent1"/>
+          </a:effectRef>
+          <a:fontRef idx="minor">
+            <a:schemeClr val="lt1"/>
+          </a:fontRef>
+        </p:style>
+        <p:txBody>
+          <a:bodyPr rtlCol="0" anchor="ctr"/>
+          <a:lstStyle/>
+          <a:p>
+            <a:pPr algn="ctr"/>
+            <a:r>
+              <a:rPr lang="en-US">
+                <a:solidFill>
+                  <a:srgbClr val="000000"/>
+                </a:solidFill>
+              </a:rPr>
+              <a:t>Devices</a:t>
+            </a:r>
+          </a:p>
+        </p:txBody>
+      </p:sp>
+      <p:sp>
+        <p:nvSpPr>
+          <p:cNvPr id="26" name="Rectangle 25"/>
+          <p:cNvSpPr/>
+          <p:nvPr/>
+        </p:nvSpPr>
+        <p:spPr>
+          <a:xfrm>
+            <a:off x="1002080" y="3616943"/>
+            <a:ext cx="1139152" cy="454304"/>
+          </a:xfrm>
+          <a:prstGeom prst="rect">
+            <a:avLst/>
+          </a:prstGeom>
+          <a:noFill/>
+          <a:ln>
+            <a:solidFill>
+              <a:schemeClr val="tx1"/>
+            </a:solidFill>
+          </a:ln>
+        </p:spPr>
+        <p:style>
+          <a:lnRef idx="1">
+            <a:schemeClr val="accent1"/>
+          </a:lnRef>
+          <a:fillRef idx="3">
+            <a:schemeClr val="accent1"/>
+          </a:fillRef>
+          <a:effectRef idx="2">
+            <a:schemeClr val="accent1"/>
+          </a:effectRef>
+          <a:fontRef idx="minor">
+            <a:schemeClr val="lt1"/>
+          </a:fontRef>
+        </p:style>
+        <p:txBody>
+          <a:bodyPr rtlCol="0" anchor="ctr"/>
+          <a:lstStyle/>
+          <a:p>
+            <a:pPr algn="ctr"/>
+            <a:r>
+              <a:rPr lang="en-US">
+                <a:solidFill>
+                  <a:srgbClr val="000000"/>
+                </a:solidFill>
+              </a:rPr>
+              <a:t>Storage</a:t>
+            </a:r>
+          </a:p>
+        </p:txBody>
+      </p:sp>
+      <p:sp>
+        <p:nvSpPr>
+          <p:cNvPr id="27" name="Rectangle 26"/>
+          <p:cNvSpPr/>
+          <p:nvPr/>
+        </p:nvSpPr>
+        <p:spPr>
+          <a:xfrm>
+            <a:off x="4644911" y="3616943"/>
+            <a:ext cx="968042" cy="454304"/>
+          </a:xfrm>
+          <a:prstGeom prst="rect">
+            <a:avLst/>
+          </a:prstGeom>
+          <a:solidFill>
+            <a:srgbClr val="FCD5B5"/>
+          </a:solidFill>
+          <a:ln>
+            <a:solidFill>
+              <a:schemeClr val="tx1"/>
+            </a:solidFill>
+          </a:ln>
+        </p:spPr>
+        <p:style>
+          <a:lnRef idx="1">
+            <a:schemeClr val="accent1"/>
+          </a:lnRef>
+          <a:fillRef idx="3">
+            <a:schemeClr val="accent1"/>
+          </a:fillRef>
+          <a:effectRef idx="2">
+            <a:schemeClr val="accent1"/>
+          </a:effectRef>
+          <a:fontRef idx="minor">
+            <a:schemeClr val="lt1"/>
+          </a:fontRef>
+        </p:style>
+        <p:txBody>
+          <a:bodyPr rtlCol="0" anchor="ctr"/>
+          <a:lstStyle/>
+          <a:p>
+            <a:pPr algn="ctr"/>
+            <a:r>
+              <a:rPr lang="en-US">
+                <a:solidFill>
+                  <a:srgbClr val="000000"/>
+                </a:solidFill>
+              </a:rPr>
+              <a:t>API</a:t>
+            </a:r>
+          </a:p>
+        </p:txBody>
+      </p:sp>
+      <p:cxnSp>
+        <p:nvCxnSpPr>
+          <p:cNvPr id="39" name="Straight Arrow Connector 38"/>
+          <p:cNvCxnSpPr>
+            <a:stCxn id="14" idx="2"/>
+            <a:endCxn id="42" idx="3"/>
+          </p:cNvCxnSpPr>
+          <p:nvPr/>
+        </p:nvCxnSpPr>
+        <p:spPr>
+          <a:xfrm flipH="1">
+            <a:off x="3988710" y="4064766"/>
+            <a:ext cx="5365" cy="320876"/>
+          </a:xfrm>
+          <a:prstGeom prst="straightConnector1">
+            <a:avLst/>
+          </a:prstGeom>
+          <a:ln>
+            <a:solidFill>
+              <a:srgbClr val="000000"/>
+            </a:solidFill>
+            <a:headEnd type="arrow"/>
+            <a:tailEnd type="arrow"/>
+          </a:ln>
+        </p:spPr>
+        <p:style>
+          <a:lnRef idx="2">
+            <a:schemeClr val="accent1"/>
+          </a:lnRef>
+          <a:fillRef idx="0">
+            <a:schemeClr val="accent1"/>
+          </a:fillRef>
+          <a:effectRef idx="1">
+            <a:schemeClr val="accent1"/>
+          </a:effectRef>
+          <a:fontRef idx="minor">
+            <a:schemeClr val="tx1"/>
+          </a:fontRef>
+        </p:style>
+      </p:cxnSp>
+      <p:sp>
+        <p:nvSpPr>
+          <p:cNvPr id="32" name="Multidocument 31"/>
+          <p:cNvSpPr/>
+          <p:nvPr/>
+        </p:nvSpPr>
+        <p:spPr>
+          <a:xfrm>
+            <a:off x="4711453" y="4427335"/>
+            <a:ext cx="963132" cy="974848"/>
+          </a:xfrm>
+          <a:prstGeom prst="flowChartMultidocument">
+            <a:avLst/>
+          </a:prstGeom>
+          <a:noFill/>
+          <a:ln>
+            <a:solidFill>
+              <a:srgbClr val="000000"/>
+            </a:solidFill>
+          </a:ln>
+        </p:spPr>
+        <p:style>
+          <a:lnRef idx="1">
+            <a:schemeClr val="accent1"/>
+          </a:lnRef>
+          <a:fillRef idx="3">
+            <a:schemeClr val="accent1"/>
+          </a:fillRef>
+          <a:effectRef idx="2">
+            <a:schemeClr val="accent1"/>
+          </a:effectRef>
+          <a:fontRef idx="minor">
+            <a:schemeClr val="lt1"/>
+          </a:fontRef>
+        </p:style>
+        <p:txBody>
+          <a:bodyPr rtlCol="0" anchor="ctr"/>
+          <a:lstStyle/>
+          <a:p>
+            <a:pPr algn="ctr"/>
+            <a:r>
+              <a:rPr lang="en-US">
+                <a:solidFill>
+                  <a:srgbClr val="000000"/>
+                </a:solidFill>
+              </a:rPr>
+              <a:t>Scripts</a:t>
+            </a:r>
+          </a:p>
+        </p:txBody>
+      </p:sp>
+      <p:cxnSp>
+        <p:nvCxnSpPr>
+          <p:cNvPr id="40" name="Straight Arrow Connector 39"/>
+          <p:cNvCxnSpPr/>
+          <p:nvPr/>
+        </p:nvCxnSpPr>
+        <p:spPr>
+          <a:xfrm>
+            <a:off x="5140433" y="4075601"/>
+            <a:ext cx="0" cy="351734"/>
+          </a:xfrm>
+          <a:prstGeom prst="straightConnector1">
+            <a:avLst/>
+          </a:prstGeom>
+          <a:ln>
+            <a:solidFill>
+              <a:srgbClr val="000000"/>
+            </a:solidFill>
+            <a:headEnd type="arrow"/>
+            <a:tailEnd type="arrow"/>
+          </a:ln>
+        </p:spPr>
+        <p:style>
+          <a:lnRef idx="2">
+            <a:schemeClr val="accent1"/>
+          </a:lnRef>
+          <a:fillRef idx="0">
+            <a:schemeClr val="accent1"/>
+          </a:fillRef>
+          <a:effectRef idx="1">
+            <a:schemeClr val="accent1"/>
+          </a:effectRef>
+          <a:fontRef idx="minor">
+            <a:schemeClr val="tx1"/>
+          </a:fontRef>
+        </p:style>
+      </p:cxnSp>
+      <p:cxnSp>
+        <p:nvCxnSpPr>
+          <p:cNvPr id="47" name="Straight Arrow Connector 46"/>
+          <p:cNvCxnSpPr/>
+          <p:nvPr/>
+        </p:nvCxnSpPr>
+        <p:spPr>
+          <a:xfrm>
+            <a:off x="5140433" y="3177260"/>
+            <a:ext cx="0" cy="429180"/>
+          </a:xfrm>
+          <a:prstGeom prst="straightConnector1">
+            <a:avLst/>
+          </a:prstGeom>
+          <a:ln>
+            <a:solidFill>
+              <a:srgbClr val="000000"/>
+            </a:solidFill>
+            <a:headEnd type="arrow"/>
+            <a:tailEnd type="arrow"/>
+          </a:ln>
+        </p:spPr>
+        <p:style>
+          <a:lnRef idx="2">
+            <a:schemeClr val="accent1"/>
+          </a:lnRef>
+          <a:fillRef idx="0">
+            <a:schemeClr val="accent1"/>
+          </a:fillRef>
+          <a:effectRef idx="1">
+            <a:schemeClr val="accent1"/>
+          </a:effectRef>
+          <a:fontRef idx="minor">
+            <a:schemeClr val="tx1"/>
+          </a:fontRef>
+        </p:style>
+      </p:cxnSp>
+      <p:cxnSp>
+        <p:nvCxnSpPr>
+          <p:cNvPr id="49" name="Straight Arrow Connector 48"/>
+          <p:cNvCxnSpPr/>
+          <p:nvPr/>
+        </p:nvCxnSpPr>
+        <p:spPr>
+          <a:xfrm>
+            <a:off x="3991478" y="3187763"/>
+            <a:ext cx="0" cy="429180"/>
+          </a:xfrm>
+          <a:prstGeom prst="straightConnector1">
+            <a:avLst/>
+          </a:prstGeom>
+          <a:ln>
+            <a:solidFill>
+              <a:srgbClr val="000000"/>
+            </a:solidFill>
+            <a:headEnd type="arrow"/>
+            <a:tailEnd type="arrow"/>
+          </a:ln>
+        </p:spPr>
+        <p:style>
+          <a:lnRef idx="2">
+            <a:schemeClr val="accent1"/>
+          </a:lnRef>
+          <a:fillRef idx="0">
+            <a:schemeClr val="accent1"/>
+          </a:fillRef>
+          <a:effectRef idx="1">
+            <a:schemeClr val="accent1"/>
+          </a:effectRef>
+          <a:fontRef idx="minor">
+            <a:schemeClr val="tx1"/>
+          </a:fontRef>
+        </p:style>
+      </p:cxnSp>
+      <p:cxnSp>
+        <p:nvCxnSpPr>
+          <p:cNvPr id="50" name="Straight Arrow Connector 49"/>
+          <p:cNvCxnSpPr/>
+          <p:nvPr/>
+        </p:nvCxnSpPr>
+        <p:spPr>
+          <a:xfrm>
+            <a:off x="2813989" y="3187763"/>
+            <a:ext cx="0" cy="429180"/>
+          </a:xfrm>
+          <a:prstGeom prst="straightConnector1">
+            <a:avLst/>
+          </a:prstGeom>
+          <a:ln>
+            <a:solidFill>
+              <a:srgbClr val="000000"/>
+            </a:solidFill>
+            <a:headEnd type="arrow"/>
+            <a:tailEnd type="arrow"/>
+          </a:ln>
+        </p:spPr>
+        <p:style>
+          <a:lnRef idx="2">
+            <a:schemeClr val="accent1"/>
+          </a:lnRef>
+          <a:fillRef idx="0">
+            <a:schemeClr val="accent1"/>
+          </a:fillRef>
+          <a:effectRef idx="1">
+            <a:schemeClr val="accent1"/>
+          </a:effectRef>
+          <a:fontRef idx="minor">
+            <a:schemeClr val="tx1"/>
+          </a:fontRef>
+        </p:style>
+      </p:cxnSp>
+      <p:cxnSp>
+        <p:nvCxnSpPr>
+          <p:cNvPr id="51" name="Straight Arrow Connector 50"/>
+          <p:cNvCxnSpPr/>
+          <p:nvPr/>
+        </p:nvCxnSpPr>
+        <p:spPr>
+          <a:xfrm>
+            <a:off x="1579786" y="3187763"/>
+            <a:ext cx="0" cy="429180"/>
+          </a:xfrm>
+          <a:prstGeom prst="straightConnector1">
+            <a:avLst/>
+          </a:prstGeom>
+          <a:ln>
+            <a:solidFill>
+              <a:srgbClr val="000000"/>
+            </a:solidFill>
+            <a:headEnd type="arrow"/>
+            <a:tailEnd type="arrow"/>
+          </a:ln>
+        </p:spPr>
+        <p:style>
+          <a:lnRef idx="2">
+            <a:schemeClr val="accent1"/>
+          </a:lnRef>
+          <a:fillRef idx="0">
+            <a:schemeClr val="accent1"/>
+          </a:fillRef>
+          <a:effectRef idx="1">
+            <a:schemeClr val="accent1"/>
+          </a:effectRef>
+          <a:fontRef idx="minor">
+            <a:schemeClr val="tx1"/>
+          </a:fontRef>
+        </p:style>
+      </p:cxnSp>
+      <p:sp>
+        <p:nvSpPr>
+          <p:cNvPr id="57" name="Rectangle 56"/>
+          <p:cNvSpPr/>
+          <p:nvPr/>
+        </p:nvSpPr>
+        <p:spPr>
+          <a:xfrm>
+            <a:off x="6116866" y="2696175"/>
+            <a:ext cx="2569934" cy="2308324"/>
+          </a:xfrm>
+          <a:prstGeom prst="rect">
+            <a:avLst/>
+          </a:prstGeom>
+        </p:spPr>
+        <p:txBody>
+          <a:bodyPr wrap="none">
+            <a:spAutoFit/>
+          </a:bodyPr>
+          <a:lstStyle/>
+          <a:p>
+            <a:r>
+              <a:rPr lang="en-US" b="1" u="sng">
+                <a:solidFill>
+                  <a:srgbClr val="000000"/>
+                </a:solidFill>
+              </a:rPr>
+              <a:t>Servient Shell</a:t>
+            </a:r>
+          </a:p>
+          <a:p>
+            <a:pPr marL="285750" indent="-285750">
+              <a:buFont typeface="Arial"/>
+              <a:buChar char="•"/>
+            </a:pPr>
+            <a:r>
+              <a:rPr lang="en-US">
+                <a:solidFill>
+                  <a:srgbClr val="000000"/>
+                </a:solidFill>
+              </a:rPr>
+              <a:t>Resource Exposer</a:t>
+            </a:r>
+          </a:p>
+          <a:p>
+            <a:pPr marL="742950" lvl="1" indent="-285750">
+              <a:buFont typeface="Arial"/>
+              <a:buChar char="•"/>
+            </a:pPr>
+            <a:r>
+              <a:rPr lang="en-US">
+                <a:solidFill>
+                  <a:srgbClr val="000000"/>
+                </a:solidFill>
+              </a:rPr>
+              <a:t>Constructor</a:t>
+            </a:r>
+          </a:p>
+          <a:p>
+            <a:pPr marL="742950" lvl="1" indent="-285750">
+              <a:buFont typeface="Arial"/>
+              <a:buChar char="•"/>
+            </a:pPr>
+            <a:r>
+              <a:rPr lang="en-US">
+                <a:solidFill>
+                  <a:srgbClr val="000000"/>
+                </a:solidFill>
+              </a:rPr>
+              <a:t>Handler Interface</a:t>
+            </a:r>
+          </a:p>
+          <a:p>
+            <a:pPr marL="285750" indent="-285750">
+              <a:buFont typeface="Arial"/>
+              <a:buChar char="•"/>
+            </a:pPr>
+            <a:r>
+              <a:rPr lang="en-US">
+                <a:solidFill>
+                  <a:srgbClr val="000000"/>
+                </a:solidFill>
+              </a:rPr>
+              <a:t>Resource Consumer </a:t>
+            </a:r>
+          </a:p>
+          <a:p>
+            <a:pPr marL="742950" lvl="1" indent="-285750">
+              <a:buFont typeface="Arial"/>
+              <a:buChar char="•"/>
+            </a:pPr>
+            <a:r>
+              <a:rPr lang="en-US">
+                <a:solidFill>
+                  <a:srgbClr val="000000"/>
+                </a:solidFill>
+              </a:rPr>
+              <a:t>Discovery </a:t>
+            </a:r>
+          </a:p>
+          <a:p>
+            <a:pPr marL="742950" lvl="1" indent="-285750">
+              <a:buFont typeface="Arial"/>
+              <a:buChar char="•"/>
+            </a:pPr>
+            <a:r>
+              <a:rPr lang="en-US">
+                <a:solidFill>
+                  <a:srgbClr val="000000"/>
+                </a:solidFill>
+              </a:rPr>
+              <a:t>Caching Client</a:t>
+            </a:r>
+          </a:p>
+          <a:p>
+            <a:pPr marL="285750" indent="-285750">
+              <a:buFont typeface="Arial"/>
+              <a:buChar char="•"/>
+            </a:pPr>
+            <a:r>
+              <a:rPr lang="en-US">
+                <a:solidFill>
+                  <a:srgbClr val="000000"/>
+                </a:solidFill>
+              </a:rPr>
+              <a:t>TD Interface</a:t>
+            </a:r>
+          </a:p>
+        </p:txBody>
+      </p:sp>
+      <p:sp>
+        <p:nvSpPr>
+          <p:cNvPr id="58" name="Left Brace 57"/>
+          <p:cNvSpPr/>
+          <p:nvPr/>
+        </p:nvSpPr>
+        <p:spPr>
+          <a:xfrm>
+            <a:off x="5720700" y="2848099"/>
+            <a:ext cx="314604" cy="2014505"/>
+          </a:xfrm>
+          <a:prstGeom prst="leftBrace">
+            <a:avLst/>
+          </a:prstGeom>
+          <a:ln>
+            <a:solidFill>
+              <a:srgbClr val="000000"/>
+            </a:solidFill>
+          </a:ln>
+        </p:spPr>
+        <p:style>
+          <a:lnRef idx="2">
+            <a:schemeClr val="accent1"/>
+          </a:lnRef>
+          <a:fillRef idx="0">
+            <a:schemeClr val="accent1"/>
+          </a:fillRef>
+          <a:effectRef idx="1">
+            <a:schemeClr val="accent1"/>
+          </a:effectRef>
+          <a:fontRef idx="minor">
+            <a:schemeClr val="tx1"/>
+          </a:fontRef>
+        </p:style>
+        <p:txBody>
+          <a:bodyPr rtlCol="0" anchor="ctr"/>
+          <a:lstStyle/>
+          <a:p>
+            <a:pPr algn="ctr"/>
             <a:endParaRPr lang="en-US"/>
           </a:p>
         </p:txBody>
@@ -7450,7 +7841,7 @@
     </p:spTree>
     <p:extLst>
       <p:ext uri="{BB962C8B-B14F-4D97-AF65-F5344CB8AC3E}">
-        <p14:creationId xmlns:p14="http://schemas.microsoft.com/office/powerpoint/2010/main" val="3872218112"/>
+        <p14:creationId xmlns:p14="http://schemas.microsoft.com/office/powerpoint/2010/main" val="1489161379"/>
       </p:ext>
     </p:extLst>
   </p:cSld>

</xml_diff>

<commit_message>
add transfer layer document
WoT transfer layer mapping document
</commit_message>
<xml_diff>
--- a/wot-11may16.pptx
+++ b/wot-11may16.pptx
@@ -15,11 +15,12 @@
     <p:sldId id="261" r:id="rId9"/>
     <p:sldId id="262" r:id="rId10"/>
     <p:sldId id="280" r:id="rId11"/>
-    <p:sldId id="282" r:id="rId12"/>
-    <p:sldId id="283" r:id="rId13"/>
-    <p:sldId id="281" r:id="rId14"/>
-    <p:sldId id="277" r:id="rId15"/>
-    <p:sldId id="279" r:id="rId16"/>
+    <p:sldId id="285" r:id="rId12"/>
+    <p:sldId id="282" r:id="rId13"/>
+    <p:sldId id="283" r:id="rId14"/>
+    <p:sldId id="281" r:id="rId15"/>
+    <p:sldId id="277" r:id="rId16"/>
+    <p:sldId id="279" r:id="rId17"/>
   </p:sldIdLst>
   <p:sldSz cx="9144000" cy="6858000" type="screen4x3"/>
   <p:notesSz cx="6858000" cy="9144000"/>
@@ -299,7 +300,7 @@
           <a:lstStyle/>
           <a:p>
             <a:fld id="{A84091BD-EE2E-D843-BE6D-38FC78E5330D}" type="datetimeFigureOut">
-              <a:t>5/2/16</a:t>
+              <a:t>5/15/16</a:t>
             </a:fld>
             <a:endParaRPr lang="en-US"/>
           </a:p>
@@ -465,7 +466,7 @@
           <a:lstStyle/>
           <a:p>
             <a:fld id="{A84091BD-EE2E-D843-BE6D-38FC78E5330D}" type="datetimeFigureOut">
-              <a:t>5/2/16</a:t>
+              <a:t>5/15/16</a:t>
             </a:fld>
             <a:endParaRPr lang="en-US"/>
           </a:p>
@@ -641,7 +642,7 @@
           <a:lstStyle/>
           <a:p>
             <a:fld id="{A84091BD-EE2E-D843-BE6D-38FC78E5330D}" type="datetimeFigureOut">
-              <a:t>5/2/16</a:t>
+              <a:t>5/15/16</a:t>
             </a:fld>
             <a:endParaRPr lang="en-US"/>
           </a:p>
@@ -807,7 +808,7 @@
           <a:lstStyle/>
           <a:p>
             <a:fld id="{A84091BD-EE2E-D843-BE6D-38FC78E5330D}" type="datetimeFigureOut">
-              <a:t>5/2/16</a:t>
+              <a:t>5/15/16</a:t>
             </a:fld>
             <a:endParaRPr lang="en-US"/>
           </a:p>
@@ -1050,7 +1051,7 @@
           <a:lstStyle/>
           <a:p>
             <a:fld id="{A84091BD-EE2E-D843-BE6D-38FC78E5330D}" type="datetimeFigureOut">
-              <a:t>5/2/16</a:t>
+              <a:t>5/15/16</a:t>
             </a:fld>
             <a:endParaRPr lang="en-US"/>
           </a:p>
@@ -1333,7 +1334,7 @@
           <a:lstStyle/>
           <a:p>
             <a:fld id="{A84091BD-EE2E-D843-BE6D-38FC78E5330D}" type="datetimeFigureOut">
-              <a:t>5/2/16</a:t>
+              <a:t>5/15/16</a:t>
             </a:fld>
             <a:endParaRPr lang="en-US"/>
           </a:p>
@@ -1750,7 +1751,7 @@
           <a:lstStyle/>
           <a:p>
             <a:fld id="{A84091BD-EE2E-D843-BE6D-38FC78E5330D}" type="datetimeFigureOut">
-              <a:t>5/2/16</a:t>
+              <a:t>5/15/16</a:t>
             </a:fld>
             <a:endParaRPr lang="en-US"/>
           </a:p>
@@ -1865,7 +1866,7 @@
           <a:lstStyle/>
           <a:p>
             <a:fld id="{A84091BD-EE2E-D843-BE6D-38FC78E5330D}" type="datetimeFigureOut">
-              <a:t>5/2/16</a:t>
+              <a:t>5/15/16</a:t>
             </a:fld>
             <a:endParaRPr lang="en-US"/>
           </a:p>
@@ -1958,7 +1959,7 @@
           <a:lstStyle/>
           <a:p>
             <a:fld id="{A84091BD-EE2E-D843-BE6D-38FC78E5330D}" type="datetimeFigureOut">
-              <a:t>5/2/16</a:t>
+              <a:t>5/15/16</a:t>
             </a:fld>
             <a:endParaRPr lang="en-US"/>
           </a:p>
@@ -2231,7 +2232,7 @@
           <a:lstStyle/>
           <a:p>
             <a:fld id="{A84091BD-EE2E-D843-BE6D-38FC78E5330D}" type="datetimeFigureOut">
-              <a:t>5/2/16</a:t>
+              <a:t>5/15/16</a:t>
             </a:fld>
             <a:endParaRPr lang="en-US"/>
           </a:p>
@@ -2481,7 +2482,7 @@
           <a:lstStyle/>
           <a:p>
             <a:fld id="{A84091BD-EE2E-D843-BE6D-38FC78E5330D}" type="datetimeFigureOut">
-              <a:t>5/2/16</a:t>
+              <a:t>5/15/16</a:t>
             </a:fld>
             <a:endParaRPr lang="en-US"/>
           </a:p>
@@ -2690,7 +2691,7 @@
           </a:lstStyle>
           <a:p>
             <a:fld id="{A84091BD-EE2E-D843-BE6D-38FC78E5330D}" type="datetimeFigureOut">
-              <a:t>5/2/16</a:t>
+              <a:t>5/15/16</a:t>
             </a:fld>
             <a:endParaRPr lang="en-US"/>
           </a:p>
@@ -4355,6 +4356,56 @@
       </p:grpSpPr>
       <p:sp>
         <p:nvSpPr>
+          <p:cNvPr id="31" name="Cloud 30"/>
+          <p:cNvSpPr/>
+          <p:nvPr/>
+        </p:nvSpPr>
+        <p:spPr>
+          <a:xfrm rot="374183">
+            <a:off x="6207145" y="1888434"/>
+            <a:ext cx="1401154" cy="1250485"/>
+          </a:xfrm>
+          <a:prstGeom prst="cloud">
+            <a:avLst/>
+          </a:prstGeom>
+          <a:solidFill>
+            <a:srgbClr val="FFFFFF"/>
+          </a:solidFill>
+          <a:ln>
+            <a:solidFill>
+              <a:srgbClr val="000000"/>
+            </a:solidFill>
+          </a:ln>
+        </p:spPr>
+        <p:style>
+          <a:lnRef idx="1">
+            <a:schemeClr val="accent1"/>
+          </a:lnRef>
+          <a:fillRef idx="3">
+            <a:schemeClr val="accent1"/>
+          </a:fillRef>
+          <a:effectRef idx="2">
+            <a:schemeClr val="accent1"/>
+          </a:effectRef>
+          <a:fontRef idx="minor">
+            <a:schemeClr val="lt1"/>
+          </a:fontRef>
+        </p:style>
+        <p:txBody>
+          <a:bodyPr rtlCol="0" anchor="ctr"/>
+          <a:lstStyle/>
+          <a:p>
+            <a:pPr algn="ctr"/>
+            <a:endParaRPr lang="en-US">
+              <a:solidFill>
+                <a:srgbClr val="000000"/>
+              </a:solidFill>
+            </a:endParaRPr>
+          </a:p>
+        </p:txBody>
+      </p:sp>
+      <p:sp>
+        <p:nvSpPr>
           <p:cNvPr id="2" name="Title 1"/>
           <p:cNvSpPr>
             <a:spLocks noGrp="1"/>
@@ -4370,7 +4421,7 @@
           <a:p>
             <a:r>
               <a:rPr lang="en-US"/>
-              <a:t>Device Server</a:t>
+              <a:t>Architecture</a:t>
             </a:r>
           </a:p>
         </p:txBody>
@@ -4383,8 +4434,8 @@
         </p:nvSpPr>
         <p:spPr>
           <a:xfrm>
-            <a:off x="2792065" y="2747892"/>
-            <a:ext cx="3340788" cy="429368"/>
+            <a:off x="1002080" y="2747892"/>
+            <a:ext cx="4610873" cy="429368"/>
           </a:xfrm>
           <a:prstGeom prst="rect">
             <a:avLst/>
@@ -4439,8 +4490,8 @@
         </p:nvSpPr>
         <p:spPr>
           <a:xfrm>
-            <a:off x="2792065" y="2281937"/>
-            <a:ext cx="3340788" cy="454304"/>
+            <a:off x="1002080" y="2281937"/>
+            <a:ext cx="4610873" cy="454304"/>
           </a:xfrm>
           <a:prstGeom prst="rect">
             <a:avLst/>
@@ -4495,7 +4546,7 @@
         </p:nvSpPr>
         <p:spPr>
           <a:xfrm>
-            <a:off x="3987025" y="3610462"/>
+            <a:off x="3467125" y="3610462"/>
             <a:ext cx="1053900" cy="454304"/>
           </a:xfrm>
           <a:prstGeom prst="rect">
@@ -4542,13 +4593,57 @@
       </p:sp>
       <p:sp>
         <p:nvSpPr>
+          <p:cNvPr id="16" name="Can 15"/>
+          <p:cNvSpPr/>
+          <p:nvPr/>
+        </p:nvSpPr>
+        <p:spPr>
+          <a:xfrm>
+            <a:off x="1209547" y="4429039"/>
+            <a:ext cx="745736" cy="780609"/>
+          </a:xfrm>
+          <a:prstGeom prst="can">
+            <a:avLst/>
+          </a:prstGeom>
+          <a:noFill/>
+          <a:ln>
+            <a:solidFill>
+              <a:srgbClr val="000000"/>
+            </a:solidFill>
+          </a:ln>
+        </p:spPr>
+        <p:style>
+          <a:lnRef idx="1">
+            <a:schemeClr val="accent1"/>
+          </a:lnRef>
+          <a:fillRef idx="3">
+            <a:schemeClr val="accent1"/>
+          </a:fillRef>
+          <a:effectRef idx="2">
+            <a:schemeClr val="accent1"/>
+          </a:effectRef>
+          <a:fontRef idx="minor">
+            <a:schemeClr val="lt1"/>
+          </a:fontRef>
+        </p:style>
+        <p:txBody>
+          <a:bodyPr rtlCol="0" anchor="ctr"/>
+          <a:lstStyle/>
+          <a:p>
+            <a:pPr algn="ctr"/>
+            <a:endParaRPr lang="en-US"/>
+          </a:p>
+        </p:txBody>
+      </p:sp>
+      <p:sp>
+        <p:nvSpPr>
           <p:cNvPr id="17" name="Oval 16"/>
           <p:cNvSpPr/>
           <p:nvPr/>
         </p:nvSpPr>
         <p:spPr>
           <a:xfrm>
-            <a:off x="2724953" y="4490552"/>
+            <a:off x="2205053" y="4490552"/>
             <a:ext cx="370112" cy="372052"/>
           </a:xfrm>
           <a:prstGeom prst="ellipse">
@@ -4594,7 +4689,7 @@
         </p:nvSpPr>
         <p:spPr>
           <a:xfrm>
-            <a:off x="3126909" y="4733295"/>
+            <a:off x="2607009" y="4733295"/>
             <a:ext cx="370112" cy="372052"/>
           </a:xfrm>
           <a:prstGeom prst="ellipse">
@@ -4640,7 +4735,7 @@
         </p:nvSpPr>
         <p:spPr>
           <a:xfrm>
-            <a:off x="3491193" y="4385642"/>
+            <a:off x="2971293" y="4385642"/>
             <a:ext cx="370112" cy="372052"/>
           </a:xfrm>
           <a:prstGeom prst="ellipse">
@@ -4686,7 +4781,7 @@
         </p:nvCxnSpPr>
         <p:spPr>
           <a:xfrm flipH="1">
-            <a:off x="3003223" y="4075601"/>
+            <a:off x="2483323" y="4075601"/>
             <a:ext cx="195866" cy="435799"/>
           </a:xfrm>
           <a:prstGeom prst="straightConnector1">
@@ -4726,7 +4821,7 @@
         </p:nvCxnSpPr>
         <p:spPr>
           <a:xfrm flipH="1">
-            <a:off x="3311965" y="4071247"/>
+            <a:off x="2792065" y="4071247"/>
             <a:ext cx="21924" cy="662048"/>
           </a:xfrm>
           <a:prstGeom prst="straightConnector1">
@@ -4763,7 +4858,7 @@
         </p:nvCxnSpPr>
         <p:spPr>
           <a:xfrm>
-            <a:off x="3491193" y="4064766"/>
+            <a:off x="2971293" y="4064766"/>
             <a:ext cx="103492" cy="332527"/>
           </a:xfrm>
           <a:prstGeom prst="straightConnector1">
@@ -4792,6 +4887,43 @@
           </a:fontRef>
         </p:style>
       </p:cxnSp>
+      <p:cxnSp>
+        <p:nvCxnSpPr>
+          <p:cNvPr id="28" name="Straight Arrow Connector 27"/>
+          <p:cNvCxnSpPr/>
+          <p:nvPr/>
+        </p:nvCxnSpPr>
+        <p:spPr>
+          <a:xfrm>
+            <a:off x="1582415" y="4054544"/>
+            <a:ext cx="0" cy="372791"/>
+          </a:xfrm>
+          <a:prstGeom prst="straightConnector1">
+            <a:avLst/>
+          </a:prstGeom>
+          <a:ln>
+            <a:solidFill>
+              <a:srgbClr val="000000"/>
+            </a:solidFill>
+            <a:headEnd type="arrow"/>
+            <a:tailEnd type="arrow"/>
+          </a:ln>
+        </p:spPr>
+        <p:style>
+          <a:lnRef idx="2">
+            <a:schemeClr val="accent1"/>
+          </a:lnRef>
+          <a:fillRef idx="0">
+            <a:schemeClr val="accent1"/>
+          </a:fillRef>
+          <a:effectRef idx="1">
+            <a:schemeClr val="accent1"/>
+          </a:effectRef>
+          <a:fontRef idx="minor">
+            <a:schemeClr val="tx1"/>
+          </a:fontRef>
+        </p:style>
+      </p:cxnSp>
       <p:sp>
         <p:nvSpPr>
           <p:cNvPr id="42" name="Cloud 41"/>
@@ -4800,7 +4932,7 @@
         </p:nvSpPr>
         <p:spPr>
           <a:xfrm>
-            <a:off x="3875712" y="4318818"/>
+            <a:off x="3355812" y="4318818"/>
             <a:ext cx="1265795" cy="1168745"/>
           </a:xfrm>
           <a:prstGeom prst="cloud">
@@ -4853,7 +4985,7 @@
         </p:nvSpPr>
         <p:spPr>
           <a:xfrm>
-            <a:off x="2792065" y="3616943"/>
+            <a:off x="2272165" y="3616943"/>
             <a:ext cx="1083647" cy="454304"/>
           </a:xfrm>
           <a:prstGeom prst="rect">
@@ -4898,13 +5030,64 @@
       </p:sp>
       <p:sp>
         <p:nvSpPr>
+          <p:cNvPr id="26" name="Rectangle 25"/>
+          <p:cNvSpPr/>
+          <p:nvPr/>
+        </p:nvSpPr>
+        <p:spPr>
+          <a:xfrm>
+            <a:off x="1002080" y="3616943"/>
+            <a:ext cx="1139152" cy="454304"/>
+          </a:xfrm>
+          <a:prstGeom prst="rect">
+            <a:avLst/>
+          </a:prstGeom>
+          <a:noFill/>
+          <a:ln>
+            <a:solidFill>
+              <a:schemeClr val="tx1"/>
+            </a:solidFill>
+          </a:ln>
+        </p:spPr>
+        <p:style>
+          <a:lnRef idx="1">
+            <a:schemeClr val="accent1"/>
+          </a:lnRef>
+          <a:fillRef idx="3">
+            <a:schemeClr val="accent1"/>
+          </a:fillRef>
+          <a:effectRef idx="2">
+            <a:schemeClr val="accent1"/>
+          </a:effectRef>
+          <a:fontRef idx="minor">
+            <a:schemeClr val="lt1"/>
+          </a:fontRef>
+        </p:style>
+        <p:txBody>
+          <a:bodyPr rtlCol="0" anchor="ctr"/>
+          <a:lstStyle/>
+          <a:p>
+            <a:pPr algn="ctr"/>
+            <a:r>
+              <a:rPr lang="en-US">
+                <a:solidFill>
+                  <a:srgbClr val="000000"/>
+                </a:solidFill>
+              </a:rPr>
+              <a:t>Storage</a:t>
+            </a:r>
+          </a:p>
+        </p:txBody>
+      </p:sp>
+      <p:sp>
+        <p:nvSpPr>
           <p:cNvPr id="27" name="Rectangle 26"/>
           <p:cNvSpPr/>
           <p:nvPr/>
         </p:nvSpPr>
         <p:spPr>
           <a:xfrm>
-            <a:off x="5164811" y="3616943"/>
+            <a:off x="4644911" y="3616943"/>
             <a:ext cx="968042" cy="454304"/>
           </a:xfrm>
           <a:prstGeom prst="rect">
@@ -4960,7 +5143,7 @@
         </p:nvCxnSpPr>
         <p:spPr>
           <a:xfrm flipH="1">
-            <a:off x="4508610" y="4064766"/>
+            <a:off x="3988710" y="4064766"/>
             <a:ext cx="5365" cy="320876"/>
           </a:xfrm>
           <a:prstGeom prst="straightConnector1">
@@ -4997,7 +5180,7 @@
         </p:nvSpPr>
         <p:spPr>
           <a:xfrm>
-            <a:off x="5231353" y="4427335"/>
+            <a:off x="4711453" y="4427335"/>
             <a:ext cx="963132" cy="974848"/>
           </a:xfrm>
           <a:prstGeom prst="flowChartMultidocument">
@@ -5048,7 +5231,7 @@
         </p:nvCxnSpPr>
         <p:spPr>
           <a:xfrm>
-            <a:off x="5660333" y="4075601"/>
+            <a:off x="5140433" y="4075601"/>
             <a:ext cx="0" cy="351734"/>
           </a:xfrm>
           <a:prstGeom prst="straightConnector1">
@@ -5085,7 +5268,7 @@
         </p:nvCxnSpPr>
         <p:spPr>
           <a:xfrm>
-            <a:off x="5660333" y="3177260"/>
+            <a:off x="5140433" y="3177260"/>
             <a:ext cx="0" cy="429180"/>
           </a:xfrm>
           <a:prstGeom prst="straightConnector1">
@@ -5122,7 +5305,7 @@
         </p:nvCxnSpPr>
         <p:spPr>
           <a:xfrm>
-            <a:off x="4511378" y="3187763"/>
+            <a:off x="3991478" y="3187763"/>
             <a:ext cx="0" cy="429180"/>
           </a:xfrm>
           <a:prstGeom prst="straightConnector1">
@@ -5159,7 +5342,7 @@
         </p:nvCxnSpPr>
         <p:spPr>
           <a:xfrm>
-            <a:off x="3333889" y="3187763"/>
+            <a:off x="2813989" y="3187763"/>
             <a:ext cx="0" cy="429180"/>
           </a:xfrm>
           <a:prstGeom prst="straightConnector1">
@@ -5169,6 +5352,158 @@
             <a:solidFill>
               <a:srgbClr val="000000"/>
             </a:solidFill>
+            <a:headEnd type="arrow"/>
+            <a:tailEnd type="arrow"/>
+          </a:ln>
+        </p:spPr>
+        <p:style>
+          <a:lnRef idx="2">
+            <a:schemeClr val="accent1"/>
+          </a:lnRef>
+          <a:fillRef idx="0">
+            <a:schemeClr val="accent1"/>
+          </a:fillRef>
+          <a:effectRef idx="1">
+            <a:schemeClr val="accent1"/>
+          </a:effectRef>
+          <a:fontRef idx="minor">
+            <a:schemeClr val="tx1"/>
+          </a:fontRef>
+        </p:style>
+      </p:cxnSp>
+      <p:cxnSp>
+        <p:nvCxnSpPr>
+          <p:cNvPr id="51" name="Straight Arrow Connector 50"/>
+          <p:cNvCxnSpPr/>
+          <p:nvPr/>
+        </p:nvCxnSpPr>
+        <p:spPr>
+          <a:xfrm>
+            <a:off x="1579786" y="3187763"/>
+            <a:ext cx="0" cy="429180"/>
+          </a:xfrm>
+          <a:prstGeom prst="straightConnector1">
+            <a:avLst/>
+          </a:prstGeom>
+          <a:ln>
+            <a:solidFill>
+              <a:srgbClr val="000000"/>
+            </a:solidFill>
+            <a:headEnd type="arrow"/>
+            <a:tailEnd type="arrow"/>
+          </a:ln>
+        </p:spPr>
+        <p:style>
+          <a:lnRef idx="2">
+            <a:schemeClr val="accent1"/>
+          </a:lnRef>
+          <a:fillRef idx="0">
+            <a:schemeClr val="accent1"/>
+          </a:fillRef>
+          <a:effectRef idx="1">
+            <a:schemeClr val="accent1"/>
+          </a:effectRef>
+          <a:fontRef idx="minor">
+            <a:schemeClr val="tx1"/>
+          </a:fontRef>
+        </p:style>
+      </p:cxnSp>
+      <p:sp>
+        <p:nvSpPr>
+          <p:cNvPr id="57" name="Rectangle 56"/>
+          <p:cNvSpPr/>
+          <p:nvPr/>
+        </p:nvSpPr>
+        <p:spPr>
+          <a:xfrm>
+            <a:off x="6143371" y="3211718"/>
+            <a:ext cx="1428290" cy="646331"/>
+          </a:xfrm>
+          <a:prstGeom prst="rect">
+            <a:avLst/>
+          </a:prstGeom>
+        </p:spPr>
+        <p:txBody>
+          <a:bodyPr wrap="square">
+            <a:spAutoFit/>
+          </a:bodyPr>
+          <a:lstStyle/>
+          <a:p>
+            <a:pPr algn="ctr"/>
+            <a:r>
+              <a:rPr lang="en-US">
+                <a:solidFill>
+                  <a:srgbClr val="000000"/>
+                </a:solidFill>
+              </a:rPr>
+              <a:t>Semantic Annotation</a:t>
+            </a:r>
+          </a:p>
+        </p:txBody>
+      </p:sp>
+      <p:sp>
+        <p:nvSpPr>
+          <p:cNvPr id="29" name="Can 28"/>
+          <p:cNvSpPr/>
+          <p:nvPr/>
+        </p:nvSpPr>
+        <p:spPr>
+          <a:xfrm>
+            <a:off x="6492602" y="2123641"/>
+            <a:ext cx="745736" cy="780609"/>
+          </a:xfrm>
+          <a:prstGeom prst="can">
+            <a:avLst/>
+          </a:prstGeom>
+          <a:noFill/>
+          <a:ln>
+            <a:solidFill>
+              <a:srgbClr val="000000"/>
+            </a:solidFill>
+          </a:ln>
+        </p:spPr>
+        <p:style>
+          <a:lnRef idx="1">
+            <a:schemeClr val="accent1"/>
+          </a:lnRef>
+          <a:fillRef idx="3">
+            <a:schemeClr val="accent1"/>
+          </a:fillRef>
+          <a:effectRef idx="2">
+            <a:schemeClr val="accent1"/>
+          </a:effectRef>
+          <a:fontRef idx="minor">
+            <a:schemeClr val="lt1"/>
+          </a:fontRef>
+        </p:style>
+        <p:txBody>
+          <a:bodyPr rtlCol="0" anchor="ctr"/>
+          <a:lstStyle/>
+          <a:p>
+            <a:pPr algn="ctr"/>
+            <a:endParaRPr lang="en-US"/>
+          </a:p>
+        </p:txBody>
+      </p:sp>
+      <p:cxnSp>
+        <p:nvCxnSpPr>
+          <p:cNvPr id="30" name="Straight Arrow Connector 29"/>
+          <p:cNvCxnSpPr/>
+          <p:nvPr/>
+        </p:nvCxnSpPr>
+        <p:spPr>
+          <a:xfrm>
+            <a:off x="5685584" y="2521651"/>
+            <a:ext cx="738114" cy="0"/>
+          </a:xfrm>
+          <a:prstGeom prst="straightConnector1">
+            <a:avLst/>
+          </a:prstGeom>
+          <a:ln>
+            <a:solidFill>
+              <a:srgbClr val="000000"/>
+            </a:solidFill>
+            <a:prstDash val="lgDash"/>
             <a:headEnd type="arrow"/>
             <a:tailEnd type="arrow"/>
           </a:ln>
@@ -5191,7 +5526,7 @@
     </p:spTree>
     <p:extLst>
       <p:ext uri="{BB962C8B-B14F-4D97-AF65-F5344CB8AC3E}">
-        <p14:creationId xmlns:p14="http://schemas.microsoft.com/office/powerpoint/2010/main" val="3966011486"/>
+        <p14:creationId xmlns:p14="http://schemas.microsoft.com/office/powerpoint/2010/main" val="685875104"/>
       </p:ext>
     </p:extLst>
   </p:cSld>
@@ -5235,7 +5570,7 @@
           <a:p>
             <a:r>
               <a:rPr lang="en-US"/>
-              <a:t>Simple Device</a:t>
+              <a:t>Device Server</a:t>
             </a:r>
           </a:p>
         </p:txBody>
@@ -5248,8 +5583,8 @@
         </p:nvSpPr>
         <p:spPr>
           <a:xfrm>
-            <a:off x="3349224" y="2759543"/>
-            <a:ext cx="2248860" cy="429368"/>
+            <a:off x="2792065" y="2747892"/>
+            <a:ext cx="3340788" cy="429368"/>
           </a:xfrm>
           <a:prstGeom prst="rect">
             <a:avLst/>
@@ -5291,7 +5626,7 @@
                   <a:srgbClr val="000000"/>
                 </a:solidFill>
               </a:rPr>
-              <a:t>Transfer Layer</a:t>
+              <a:t>Abstract Transfer Layer</a:t>
             </a:r>
           </a:p>
         </p:txBody>
@@ -5304,8 +5639,8 @@
         </p:nvSpPr>
         <p:spPr>
           <a:xfrm>
-            <a:off x="3349224" y="2293588"/>
-            <a:ext cx="2248860" cy="454304"/>
+            <a:off x="2792065" y="2281937"/>
+            <a:ext cx="3340788" cy="454304"/>
           </a:xfrm>
           <a:prstGeom prst="rect">
             <a:avLst/>
@@ -5347,7 +5682,7 @@
                   <a:srgbClr val="000000"/>
                 </a:solidFill>
               </a:rPr>
-              <a:t>Resource Layer</a:t>
+              <a:t>Common Resource Layer</a:t>
             </a:r>
           </a:p>
         </p:txBody>
@@ -5360,7 +5695,7 @@
         </p:nvSpPr>
         <p:spPr>
           <a:xfrm>
-            <a:off x="4544184" y="3622113"/>
+            <a:off x="3987025" y="3610462"/>
             <a:ext cx="1053900" cy="454304"/>
           </a:xfrm>
           <a:prstGeom prst="rect">
@@ -5400,20 +5735,20 @@
                   <a:srgbClr val="000000"/>
                 </a:solidFill>
               </a:rPr>
-              <a:t>Protocol</a:t>
-            </a:r>
-          </a:p>
-        </p:txBody>
-      </p:sp>
-      <p:sp>
-        <p:nvSpPr>
-          <p:cNvPr id="18" name="Oval 17"/>
+              <a:t>Protocols</a:t>
+            </a:r>
+          </a:p>
+        </p:txBody>
+      </p:sp>
+      <p:sp>
+        <p:nvSpPr>
+          <p:cNvPr id="17" name="Oval 16"/>
           <p:cNvSpPr/>
           <p:nvPr/>
         </p:nvSpPr>
         <p:spPr>
           <a:xfrm>
-            <a:off x="3707372" y="4523577"/>
+            <a:off x="2724953" y="4490552"/>
             <a:ext cx="370112" cy="372052"/>
           </a:xfrm>
           <a:prstGeom prst="ellipse">
@@ -5451,58 +5786,18 @@
           </a:p>
         </p:txBody>
       </p:sp>
-      <p:cxnSp>
-        <p:nvCxnSpPr>
-          <p:cNvPr id="22" name="Straight Arrow Connector 21"/>
-          <p:cNvCxnSpPr>
-            <a:stCxn id="24" idx="2"/>
-            <a:endCxn id="18" idx="0"/>
-          </p:cNvCxnSpPr>
-          <p:nvPr/>
-        </p:nvCxnSpPr>
-        <p:spPr>
-          <a:xfrm>
-            <a:off x="3891048" y="4082898"/>
-            <a:ext cx="1380" cy="440679"/>
-          </a:xfrm>
-          <a:prstGeom prst="straightConnector1">
-            <a:avLst/>
-          </a:prstGeom>
-          <a:ln>
-            <a:solidFill>
-              <a:srgbClr val="000000"/>
-            </a:solidFill>
-            <a:headEnd type="arrow"/>
-            <a:tailEnd type="arrow"/>
-          </a:ln>
-        </p:spPr>
-        <p:style>
-          <a:lnRef idx="2">
-            <a:schemeClr val="accent1"/>
-          </a:lnRef>
-          <a:fillRef idx="0">
-            <a:schemeClr val="accent1"/>
-          </a:fillRef>
-          <a:effectRef idx="1">
-            <a:schemeClr val="accent1"/>
-          </a:effectRef>
-          <a:fontRef idx="minor">
-            <a:schemeClr val="tx1"/>
-          </a:fontRef>
-        </p:style>
-      </p:cxnSp>
-      <p:sp>
-        <p:nvSpPr>
-          <p:cNvPr id="42" name="Cloud 41"/>
+      <p:sp>
+        <p:nvSpPr>
+          <p:cNvPr id="18" name="Oval 17"/>
           <p:cNvSpPr/>
           <p:nvPr/>
         </p:nvSpPr>
         <p:spPr>
           <a:xfrm>
-            <a:off x="4444523" y="4330469"/>
-            <a:ext cx="1265795" cy="786529"/>
-          </a:xfrm>
-          <a:prstGeom prst="cloud">
+            <a:off x="3126909" y="4733295"/>
+            <a:ext cx="370112" cy="372052"/>
+          </a:xfrm>
+          <a:prstGeom prst="ellipse">
             <a:avLst/>
           </a:prstGeom>
           <a:solidFill>
@@ -5533,13 +5828,219 @@
           <a:lstStyle/>
           <a:p>
             <a:pPr algn="ctr"/>
+            <a:endParaRPr lang="en-US"/>
+          </a:p>
+        </p:txBody>
+      </p:sp>
+      <p:sp>
+        <p:nvSpPr>
+          <p:cNvPr id="19" name="Oval 18"/>
+          <p:cNvSpPr/>
+          <p:nvPr/>
+        </p:nvSpPr>
+        <p:spPr>
+          <a:xfrm>
+            <a:off x="3491193" y="4385642"/>
+            <a:ext cx="370112" cy="372052"/>
+          </a:xfrm>
+          <a:prstGeom prst="ellipse">
+            <a:avLst/>
+          </a:prstGeom>
+          <a:solidFill>
+            <a:srgbClr val="FFFFFF"/>
+          </a:solidFill>
+          <a:ln>
+            <a:solidFill>
+              <a:srgbClr val="000000"/>
+            </a:solidFill>
+          </a:ln>
+        </p:spPr>
+        <p:style>
+          <a:lnRef idx="1">
+            <a:schemeClr val="accent1"/>
+          </a:lnRef>
+          <a:fillRef idx="3">
+            <a:schemeClr val="accent1"/>
+          </a:fillRef>
+          <a:effectRef idx="2">
+            <a:schemeClr val="accent1"/>
+          </a:effectRef>
+          <a:fontRef idx="minor">
+            <a:schemeClr val="lt1"/>
+          </a:fontRef>
+        </p:style>
+        <p:txBody>
+          <a:bodyPr rtlCol="0" anchor="ctr"/>
+          <a:lstStyle/>
+          <a:p>
+            <a:pPr algn="ctr"/>
+            <a:endParaRPr lang="en-US"/>
+          </a:p>
+        </p:txBody>
+      </p:sp>
+      <p:cxnSp>
+        <p:nvCxnSpPr>
+          <p:cNvPr id="21" name="Straight Arrow Connector 20"/>
+          <p:cNvCxnSpPr/>
+          <p:nvPr/>
+        </p:nvCxnSpPr>
+        <p:spPr>
+          <a:xfrm flipH="1">
+            <a:off x="3003223" y="4075601"/>
+            <a:ext cx="195866" cy="435799"/>
+          </a:xfrm>
+          <a:prstGeom prst="straightConnector1">
+            <a:avLst/>
+          </a:prstGeom>
+          <a:ln>
+            <a:solidFill>
+              <a:srgbClr val="000000"/>
+            </a:solidFill>
+            <a:headEnd type="arrow"/>
+            <a:tailEnd type="arrow"/>
+          </a:ln>
+        </p:spPr>
+        <p:style>
+          <a:lnRef idx="2">
+            <a:schemeClr val="accent1"/>
+          </a:lnRef>
+          <a:fillRef idx="0">
+            <a:schemeClr val="accent1"/>
+          </a:fillRef>
+          <a:effectRef idx="1">
+            <a:schemeClr val="accent1"/>
+          </a:effectRef>
+          <a:fontRef idx="minor">
+            <a:schemeClr val="tx1"/>
+          </a:fontRef>
+        </p:style>
+      </p:cxnSp>
+      <p:cxnSp>
+        <p:nvCxnSpPr>
+          <p:cNvPr id="22" name="Straight Arrow Connector 21"/>
+          <p:cNvCxnSpPr>
+            <a:stCxn id="24" idx="2"/>
+            <a:endCxn id="18" idx="0"/>
+          </p:cNvCxnSpPr>
+          <p:nvPr/>
+        </p:nvCxnSpPr>
+        <p:spPr>
+          <a:xfrm flipH="1">
+            <a:off x="3311965" y="4071247"/>
+            <a:ext cx="21924" cy="662048"/>
+          </a:xfrm>
+          <a:prstGeom prst="straightConnector1">
+            <a:avLst/>
+          </a:prstGeom>
+          <a:ln>
+            <a:solidFill>
+              <a:srgbClr val="000000"/>
+            </a:solidFill>
+            <a:headEnd type="arrow"/>
+            <a:tailEnd type="arrow"/>
+          </a:ln>
+        </p:spPr>
+        <p:style>
+          <a:lnRef idx="2">
+            <a:schemeClr val="accent1"/>
+          </a:lnRef>
+          <a:fillRef idx="0">
+            <a:schemeClr val="accent1"/>
+          </a:fillRef>
+          <a:effectRef idx="1">
+            <a:schemeClr val="accent1"/>
+          </a:effectRef>
+          <a:fontRef idx="minor">
+            <a:schemeClr val="tx1"/>
+          </a:fontRef>
+        </p:style>
+      </p:cxnSp>
+      <p:cxnSp>
+        <p:nvCxnSpPr>
+          <p:cNvPr id="25" name="Straight Arrow Connector 24"/>
+          <p:cNvCxnSpPr/>
+          <p:nvPr/>
+        </p:nvCxnSpPr>
+        <p:spPr>
+          <a:xfrm>
+            <a:off x="3491193" y="4064766"/>
+            <a:ext cx="103492" cy="332527"/>
+          </a:xfrm>
+          <a:prstGeom prst="straightConnector1">
+            <a:avLst/>
+          </a:prstGeom>
+          <a:ln>
+            <a:solidFill>
+              <a:srgbClr val="000000"/>
+            </a:solidFill>
+            <a:headEnd type="arrow"/>
+            <a:tailEnd type="arrow"/>
+          </a:ln>
+        </p:spPr>
+        <p:style>
+          <a:lnRef idx="2">
+            <a:schemeClr val="accent1"/>
+          </a:lnRef>
+          <a:fillRef idx="0">
+            <a:schemeClr val="accent1"/>
+          </a:fillRef>
+          <a:effectRef idx="1">
+            <a:schemeClr val="accent1"/>
+          </a:effectRef>
+          <a:fontRef idx="minor">
+            <a:schemeClr val="tx1"/>
+          </a:fontRef>
+        </p:style>
+      </p:cxnSp>
+      <p:sp>
+        <p:nvSpPr>
+          <p:cNvPr id="42" name="Cloud 41"/>
+          <p:cNvSpPr/>
+          <p:nvPr/>
+        </p:nvSpPr>
+        <p:spPr>
+          <a:xfrm>
+            <a:off x="3875712" y="4318818"/>
+            <a:ext cx="1265795" cy="1168745"/>
+          </a:xfrm>
+          <a:prstGeom prst="cloud">
+            <a:avLst/>
+          </a:prstGeom>
+          <a:solidFill>
+            <a:srgbClr val="FFFFFF"/>
+          </a:solidFill>
+          <a:ln>
+            <a:solidFill>
+              <a:srgbClr val="000000"/>
+            </a:solidFill>
+          </a:ln>
+        </p:spPr>
+        <p:style>
+          <a:lnRef idx="1">
+            <a:schemeClr val="accent1"/>
+          </a:lnRef>
+          <a:fillRef idx="3">
+            <a:schemeClr val="accent1"/>
+          </a:fillRef>
+          <a:effectRef idx="2">
+            <a:schemeClr val="accent1"/>
+          </a:effectRef>
+          <a:fontRef idx="minor">
+            <a:schemeClr val="lt1"/>
+          </a:fontRef>
+        </p:style>
+        <p:txBody>
+          <a:bodyPr rtlCol="0" anchor="ctr"/>
+          <a:lstStyle/>
+          <a:p>
+            <a:pPr algn="ctr"/>
             <a:r>
               <a:rPr lang="en-US">
                 <a:solidFill>
                   <a:srgbClr val="000000"/>
                 </a:solidFill>
               </a:rPr>
-              <a:t>CoAP</a:t>
+              <a:t>HTTP, CoAP, MQTT</a:t>
             </a:r>
           </a:p>
         </p:txBody>
@@ -5552,7 +6053,7 @@
         </p:nvSpPr>
         <p:spPr>
           <a:xfrm>
-            <a:off x="3349224" y="3628594"/>
+            <a:off x="2792065" y="3616943"/>
             <a:ext cx="1083647" cy="454304"/>
           </a:xfrm>
           <a:prstGeom prst="rect">
@@ -5590,7 +6091,60 @@
                   <a:srgbClr val="000000"/>
                 </a:solidFill>
               </a:rPr>
-              <a:t>Device</a:t>
+              <a:t>Devices</a:t>
+            </a:r>
+          </a:p>
+        </p:txBody>
+      </p:sp>
+      <p:sp>
+        <p:nvSpPr>
+          <p:cNvPr id="27" name="Rectangle 26"/>
+          <p:cNvSpPr/>
+          <p:nvPr/>
+        </p:nvSpPr>
+        <p:spPr>
+          <a:xfrm>
+            <a:off x="5164811" y="3616943"/>
+            <a:ext cx="968042" cy="454304"/>
+          </a:xfrm>
+          <a:prstGeom prst="rect">
+            <a:avLst/>
+          </a:prstGeom>
+          <a:solidFill>
+            <a:srgbClr val="FCD5B5"/>
+          </a:solidFill>
+          <a:ln>
+            <a:solidFill>
+              <a:schemeClr val="tx1"/>
+            </a:solidFill>
+          </a:ln>
+        </p:spPr>
+        <p:style>
+          <a:lnRef idx="1">
+            <a:schemeClr val="accent1"/>
+          </a:lnRef>
+          <a:fillRef idx="3">
+            <a:schemeClr val="accent1"/>
+          </a:fillRef>
+          <a:effectRef idx="2">
+            <a:schemeClr val="accent1"/>
+          </a:effectRef>
+          <a:fontRef idx="minor">
+            <a:schemeClr val="lt1"/>
+          </a:fontRef>
+        </p:style>
+        <p:txBody>
+          <a:bodyPr rtlCol="0" anchor="ctr"/>
+          <a:lstStyle/>
+          <a:p>
+            <a:pPr algn="ctr"/>
+            <a:r>
+              <a:rPr lang="en-US">
+                <a:solidFill>
+                  <a:srgbClr val="000000"/>
+                </a:solidFill>
+              </a:rPr>
+              <a:t>API</a:t>
             </a:r>
           </a:p>
         </p:txBody>
@@ -5605,9 +6159,134 @@
           <p:nvPr/>
         </p:nvCxnSpPr>
         <p:spPr>
-          <a:xfrm>
-            <a:off x="5071134" y="4076417"/>
-            <a:ext cx="6287" cy="299023"/>
+          <a:xfrm flipH="1">
+            <a:off x="4508610" y="4064766"/>
+            <a:ext cx="5365" cy="320876"/>
+          </a:xfrm>
+          <a:prstGeom prst="straightConnector1">
+            <a:avLst/>
+          </a:prstGeom>
+          <a:ln>
+            <a:solidFill>
+              <a:srgbClr val="000000"/>
+            </a:solidFill>
+            <a:headEnd type="arrow"/>
+            <a:tailEnd type="arrow"/>
+          </a:ln>
+        </p:spPr>
+        <p:style>
+          <a:lnRef idx="2">
+            <a:schemeClr val="accent1"/>
+          </a:lnRef>
+          <a:fillRef idx="0">
+            <a:schemeClr val="accent1"/>
+          </a:fillRef>
+          <a:effectRef idx="1">
+            <a:schemeClr val="accent1"/>
+          </a:effectRef>
+          <a:fontRef idx="minor">
+            <a:schemeClr val="tx1"/>
+          </a:fontRef>
+        </p:style>
+      </p:cxnSp>
+      <p:sp>
+        <p:nvSpPr>
+          <p:cNvPr id="32" name="Multidocument 31"/>
+          <p:cNvSpPr/>
+          <p:nvPr/>
+        </p:nvSpPr>
+        <p:spPr>
+          <a:xfrm>
+            <a:off x="5231353" y="4427335"/>
+            <a:ext cx="963132" cy="974848"/>
+          </a:xfrm>
+          <a:prstGeom prst="flowChartMultidocument">
+            <a:avLst/>
+          </a:prstGeom>
+          <a:noFill/>
+          <a:ln>
+            <a:solidFill>
+              <a:srgbClr val="000000"/>
+            </a:solidFill>
+          </a:ln>
+        </p:spPr>
+        <p:style>
+          <a:lnRef idx="1">
+            <a:schemeClr val="accent1"/>
+          </a:lnRef>
+          <a:fillRef idx="3">
+            <a:schemeClr val="accent1"/>
+          </a:fillRef>
+          <a:effectRef idx="2">
+            <a:schemeClr val="accent1"/>
+          </a:effectRef>
+          <a:fontRef idx="minor">
+            <a:schemeClr val="lt1"/>
+          </a:fontRef>
+        </p:style>
+        <p:txBody>
+          <a:bodyPr rtlCol="0" anchor="ctr"/>
+          <a:lstStyle/>
+          <a:p>
+            <a:pPr algn="ctr"/>
+            <a:r>
+              <a:rPr lang="en-US">
+                <a:solidFill>
+                  <a:srgbClr val="000000"/>
+                </a:solidFill>
+              </a:rPr>
+              <a:t>Scripts</a:t>
+            </a:r>
+          </a:p>
+        </p:txBody>
+      </p:sp>
+      <p:cxnSp>
+        <p:nvCxnSpPr>
+          <p:cNvPr id="40" name="Straight Arrow Connector 39"/>
+          <p:cNvCxnSpPr/>
+          <p:nvPr/>
+        </p:nvCxnSpPr>
+        <p:spPr>
+          <a:xfrm>
+            <a:off x="5660333" y="4075601"/>
+            <a:ext cx="0" cy="351734"/>
+          </a:xfrm>
+          <a:prstGeom prst="straightConnector1">
+            <a:avLst/>
+          </a:prstGeom>
+          <a:ln>
+            <a:solidFill>
+              <a:srgbClr val="000000"/>
+            </a:solidFill>
+            <a:headEnd type="arrow"/>
+            <a:tailEnd type="arrow"/>
+          </a:ln>
+        </p:spPr>
+        <p:style>
+          <a:lnRef idx="2">
+            <a:schemeClr val="accent1"/>
+          </a:lnRef>
+          <a:fillRef idx="0">
+            <a:schemeClr val="accent1"/>
+          </a:fillRef>
+          <a:effectRef idx="1">
+            <a:schemeClr val="accent1"/>
+          </a:effectRef>
+          <a:fontRef idx="minor">
+            <a:schemeClr val="tx1"/>
+          </a:fontRef>
+        </p:style>
+      </p:cxnSp>
+      <p:cxnSp>
+        <p:nvCxnSpPr>
+          <p:cNvPr id="47" name="Straight Arrow Connector 46"/>
+          <p:cNvCxnSpPr/>
+          <p:nvPr/>
+        </p:nvCxnSpPr>
+        <p:spPr>
+          <a:xfrm>
+            <a:off x="5660333" y="3177260"/>
+            <a:ext cx="0" cy="429180"/>
           </a:xfrm>
           <a:prstGeom prst="straightConnector1">
             <a:avLst/>
@@ -5643,7 +6322,7 @@
         </p:nvCxnSpPr>
         <p:spPr>
           <a:xfrm>
-            <a:off x="5068537" y="3199414"/>
+            <a:off x="4511378" y="3187763"/>
             <a:ext cx="0" cy="429180"/>
           </a:xfrm>
           <a:prstGeom prst="straightConnector1">
@@ -5680,7 +6359,7 @@
         </p:nvCxnSpPr>
         <p:spPr>
           <a:xfrm>
-            <a:off x="3891048" y="3199414"/>
+            <a:off x="3333889" y="3187763"/>
             <a:ext cx="0" cy="429180"/>
           </a:xfrm>
           <a:prstGeom prst="straightConnector1">
@@ -5712,7 +6391,7 @@
     </p:spTree>
     <p:extLst>
       <p:ext uri="{BB962C8B-B14F-4D97-AF65-F5344CB8AC3E}">
-        <p14:creationId xmlns:p14="http://schemas.microsoft.com/office/powerpoint/2010/main" val="584128161"/>
+        <p14:creationId xmlns:p14="http://schemas.microsoft.com/office/powerpoint/2010/main" val="3966011486"/>
       </p:ext>
     </p:extLst>
   </p:cSld>
@@ -5756,7 +6435,7 @@
           <a:p>
             <a:r>
               <a:rPr lang="en-US"/>
-              <a:t>Scripting Client</a:t>
+              <a:t>Simple Device</a:t>
             </a:r>
           </a:p>
         </p:txBody>
@@ -5769,8 +6448,8 @@
         </p:nvSpPr>
         <p:spPr>
           <a:xfrm>
-            <a:off x="3338950" y="2341827"/>
-            <a:ext cx="2145828" cy="637368"/>
+            <a:off x="3349224" y="2759543"/>
+            <a:ext cx="2248860" cy="429368"/>
           </a:xfrm>
           <a:prstGeom prst="rect">
             <a:avLst/>
@@ -5812,7 +6491,63 @@
                   <a:srgbClr val="000000"/>
                 </a:solidFill>
               </a:rPr>
-              <a:t>Abstract Transfer Layer</a:t>
+              <a:t>Transfer Layer</a:t>
+            </a:r>
+          </a:p>
+        </p:txBody>
+      </p:sp>
+      <p:sp>
+        <p:nvSpPr>
+          <p:cNvPr id="13" name="Rectangle 12"/>
+          <p:cNvSpPr/>
+          <p:nvPr/>
+        </p:nvSpPr>
+        <p:spPr>
+          <a:xfrm>
+            <a:off x="3349224" y="2293588"/>
+            <a:ext cx="2248860" cy="454304"/>
+          </a:xfrm>
+          <a:prstGeom prst="rect">
+            <a:avLst/>
+          </a:prstGeom>
+          <a:solidFill>
+            <a:schemeClr val="accent6">
+              <a:lumMod val="40000"/>
+              <a:lumOff val="60000"/>
+            </a:schemeClr>
+          </a:solidFill>
+          <a:ln>
+            <a:solidFill>
+              <a:schemeClr val="tx1"/>
+            </a:solidFill>
+          </a:ln>
+        </p:spPr>
+        <p:style>
+          <a:lnRef idx="1">
+            <a:schemeClr val="accent1"/>
+          </a:lnRef>
+          <a:fillRef idx="3">
+            <a:schemeClr val="accent1"/>
+          </a:fillRef>
+          <a:effectRef idx="2">
+            <a:schemeClr val="accent1"/>
+          </a:effectRef>
+          <a:fontRef idx="minor">
+            <a:schemeClr val="lt1"/>
+          </a:fontRef>
+        </p:style>
+        <p:txBody>
+          <a:bodyPr rtlCol="0" anchor="ctr"/>
+          <a:lstStyle/>
+          <a:p>
+            <a:pPr algn="ctr"/>
+            <a:r>
+              <a:rPr lang="en-US">
+                <a:solidFill>
+                  <a:srgbClr val="000000"/>
+                </a:solidFill>
+              </a:rPr>
+              <a:t>Resource Layer</a:t>
             </a:r>
           </a:p>
         </p:txBody>
@@ -5825,7 +6560,7 @@
         </p:nvSpPr>
         <p:spPr>
           <a:xfrm>
-            <a:off x="3338950" y="3412397"/>
+            <a:off x="4544184" y="3622113"/>
             <a:ext cx="1053900" cy="454304"/>
           </a:xfrm>
           <a:prstGeom prst="rect">
@@ -5865,23 +6600,23 @@
                   <a:srgbClr val="000000"/>
                 </a:solidFill>
               </a:rPr>
-              <a:t>Protocols</a:t>
-            </a:r>
-          </a:p>
-        </p:txBody>
-      </p:sp>
-      <p:sp>
-        <p:nvSpPr>
-          <p:cNvPr id="42" name="Cloud 41"/>
+              <a:t>Protocol</a:t>
+            </a:r>
+          </a:p>
+        </p:txBody>
+      </p:sp>
+      <p:sp>
+        <p:nvSpPr>
+          <p:cNvPr id="18" name="Oval 17"/>
           <p:cNvSpPr/>
           <p:nvPr/>
         </p:nvSpPr>
         <p:spPr>
           <a:xfrm>
-            <a:off x="3227637" y="4120753"/>
-            <a:ext cx="1265795" cy="1168745"/>
-          </a:xfrm>
-          <a:prstGeom prst="cloud">
+            <a:off x="3707372" y="4523577"/>
+            <a:ext cx="370112" cy="372052"/>
+          </a:xfrm>
+          <a:prstGeom prst="ellipse">
             <a:avLst/>
           </a:prstGeom>
           <a:solidFill>
@@ -5912,34 +6647,118 @@
           <a:lstStyle/>
           <a:p>
             <a:pPr algn="ctr"/>
+            <a:endParaRPr lang="en-US"/>
+          </a:p>
+        </p:txBody>
+      </p:sp>
+      <p:cxnSp>
+        <p:nvCxnSpPr>
+          <p:cNvPr id="22" name="Straight Arrow Connector 21"/>
+          <p:cNvCxnSpPr>
+            <a:stCxn id="24" idx="2"/>
+            <a:endCxn id="18" idx="0"/>
+          </p:cNvCxnSpPr>
+          <p:nvPr/>
+        </p:nvCxnSpPr>
+        <p:spPr>
+          <a:xfrm>
+            <a:off x="3891048" y="4082898"/>
+            <a:ext cx="1380" cy="440679"/>
+          </a:xfrm>
+          <a:prstGeom prst="straightConnector1">
+            <a:avLst/>
+          </a:prstGeom>
+          <a:ln>
+            <a:solidFill>
+              <a:srgbClr val="000000"/>
+            </a:solidFill>
+            <a:headEnd type="arrow"/>
+            <a:tailEnd type="arrow"/>
+          </a:ln>
+        </p:spPr>
+        <p:style>
+          <a:lnRef idx="2">
+            <a:schemeClr val="accent1"/>
+          </a:lnRef>
+          <a:fillRef idx="0">
+            <a:schemeClr val="accent1"/>
+          </a:fillRef>
+          <a:effectRef idx="1">
+            <a:schemeClr val="accent1"/>
+          </a:effectRef>
+          <a:fontRef idx="minor">
+            <a:schemeClr val="tx1"/>
+          </a:fontRef>
+        </p:style>
+      </p:cxnSp>
+      <p:sp>
+        <p:nvSpPr>
+          <p:cNvPr id="42" name="Cloud 41"/>
+          <p:cNvSpPr/>
+          <p:nvPr/>
+        </p:nvSpPr>
+        <p:spPr>
+          <a:xfrm>
+            <a:off x="4444523" y="4330469"/>
+            <a:ext cx="1265795" cy="786529"/>
+          </a:xfrm>
+          <a:prstGeom prst="cloud">
+            <a:avLst/>
+          </a:prstGeom>
+          <a:solidFill>
+            <a:srgbClr val="FFFFFF"/>
+          </a:solidFill>
+          <a:ln>
+            <a:solidFill>
+              <a:srgbClr val="000000"/>
+            </a:solidFill>
+          </a:ln>
+        </p:spPr>
+        <p:style>
+          <a:lnRef idx="1">
+            <a:schemeClr val="accent1"/>
+          </a:lnRef>
+          <a:fillRef idx="3">
+            <a:schemeClr val="accent1"/>
+          </a:fillRef>
+          <a:effectRef idx="2">
+            <a:schemeClr val="accent1"/>
+          </a:effectRef>
+          <a:fontRef idx="minor">
+            <a:schemeClr val="lt1"/>
+          </a:fontRef>
+        </p:style>
+        <p:txBody>
+          <a:bodyPr rtlCol="0" anchor="ctr"/>
+          <a:lstStyle/>
+          <a:p>
+            <a:pPr algn="ctr"/>
             <a:r>
               <a:rPr lang="en-US">
                 <a:solidFill>
                   <a:srgbClr val="000000"/>
                 </a:solidFill>
               </a:rPr>
-              <a:t>HTTP, CoAP, MQTT</a:t>
-            </a:r>
-          </a:p>
-        </p:txBody>
-      </p:sp>
-      <p:sp>
-        <p:nvSpPr>
-          <p:cNvPr id="27" name="Rectangle 26"/>
+              <a:t>CoAP</a:t>
+            </a:r>
+          </a:p>
+        </p:txBody>
+      </p:sp>
+      <p:sp>
+        <p:nvSpPr>
+          <p:cNvPr id="24" name="Rectangle 23"/>
           <p:cNvSpPr/>
           <p:nvPr/>
         </p:nvSpPr>
         <p:spPr>
           <a:xfrm>
-            <a:off x="4516736" y="3418878"/>
-            <a:ext cx="968042" cy="454304"/>
+            <a:off x="3349224" y="3628594"/>
+            <a:ext cx="1083647" cy="454304"/>
           </a:xfrm>
           <a:prstGeom prst="rect">
             <a:avLst/>
           </a:prstGeom>
-          <a:solidFill>
-            <a:srgbClr val="FCD5B5"/>
-          </a:solidFill>
+          <a:noFill/>
           <a:ln>
             <a:solidFill>
               <a:schemeClr val="tx1"/>
@@ -5971,7 +6790,7 @@
                   <a:srgbClr val="000000"/>
                 </a:solidFill>
               </a:rPr>
-              <a:t>API</a:t>
+              <a:t>Device</a:t>
             </a:r>
           </a:p>
         </p:txBody>
@@ -5986,134 +6805,9 @@
           <p:nvPr/>
         </p:nvCxnSpPr>
         <p:spPr>
-          <a:xfrm flipH="1">
-            <a:off x="3860535" y="3866701"/>
-            <a:ext cx="5365" cy="320876"/>
-          </a:xfrm>
-          <a:prstGeom prst="straightConnector1">
-            <a:avLst/>
-          </a:prstGeom>
-          <a:ln>
-            <a:solidFill>
-              <a:srgbClr val="000000"/>
-            </a:solidFill>
-            <a:headEnd type="arrow"/>
-            <a:tailEnd type="arrow"/>
-          </a:ln>
-        </p:spPr>
-        <p:style>
-          <a:lnRef idx="2">
-            <a:schemeClr val="accent1"/>
-          </a:lnRef>
-          <a:fillRef idx="0">
-            <a:schemeClr val="accent1"/>
-          </a:fillRef>
-          <a:effectRef idx="1">
-            <a:schemeClr val="accent1"/>
-          </a:effectRef>
-          <a:fontRef idx="minor">
-            <a:schemeClr val="tx1"/>
-          </a:fontRef>
-        </p:style>
-      </p:cxnSp>
-      <p:sp>
-        <p:nvSpPr>
-          <p:cNvPr id="32" name="Multidocument 31"/>
-          <p:cNvSpPr/>
-          <p:nvPr/>
-        </p:nvSpPr>
-        <p:spPr>
-          <a:xfrm>
-            <a:off x="4583278" y="4229270"/>
-            <a:ext cx="963132" cy="974848"/>
-          </a:xfrm>
-          <a:prstGeom prst="flowChartMultidocument">
-            <a:avLst/>
-          </a:prstGeom>
-          <a:noFill/>
-          <a:ln>
-            <a:solidFill>
-              <a:srgbClr val="000000"/>
-            </a:solidFill>
-          </a:ln>
-        </p:spPr>
-        <p:style>
-          <a:lnRef idx="1">
-            <a:schemeClr val="accent1"/>
-          </a:lnRef>
-          <a:fillRef idx="3">
-            <a:schemeClr val="accent1"/>
-          </a:fillRef>
-          <a:effectRef idx="2">
-            <a:schemeClr val="accent1"/>
-          </a:effectRef>
-          <a:fontRef idx="minor">
-            <a:schemeClr val="lt1"/>
-          </a:fontRef>
-        </p:style>
-        <p:txBody>
-          <a:bodyPr rtlCol="0" anchor="ctr"/>
-          <a:lstStyle/>
-          <a:p>
-            <a:pPr algn="ctr"/>
-            <a:r>
-              <a:rPr lang="en-US">
-                <a:solidFill>
-                  <a:srgbClr val="000000"/>
-                </a:solidFill>
-              </a:rPr>
-              <a:t>Scripts</a:t>
-            </a:r>
-          </a:p>
-        </p:txBody>
-      </p:sp>
-      <p:cxnSp>
-        <p:nvCxnSpPr>
-          <p:cNvPr id="40" name="Straight Arrow Connector 39"/>
-          <p:cNvCxnSpPr/>
-          <p:nvPr/>
-        </p:nvCxnSpPr>
-        <p:spPr>
-          <a:xfrm>
-            <a:off x="5012258" y="3877536"/>
-            <a:ext cx="0" cy="351734"/>
-          </a:xfrm>
-          <a:prstGeom prst="straightConnector1">
-            <a:avLst/>
-          </a:prstGeom>
-          <a:ln>
-            <a:solidFill>
-              <a:srgbClr val="000000"/>
-            </a:solidFill>
-            <a:headEnd type="arrow"/>
-            <a:tailEnd type="arrow"/>
-          </a:ln>
-        </p:spPr>
-        <p:style>
-          <a:lnRef idx="2">
-            <a:schemeClr val="accent1"/>
-          </a:lnRef>
-          <a:fillRef idx="0">
-            <a:schemeClr val="accent1"/>
-          </a:fillRef>
-          <a:effectRef idx="1">
-            <a:schemeClr val="accent1"/>
-          </a:effectRef>
-          <a:fontRef idx="minor">
-            <a:schemeClr val="tx1"/>
-          </a:fontRef>
-        </p:style>
-      </p:cxnSp>
-      <p:cxnSp>
-        <p:nvCxnSpPr>
-          <p:cNvPr id="47" name="Straight Arrow Connector 46"/>
-          <p:cNvCxnSpPr/>
-          <p:nvPr/>
-        </p:nvCxnSpPr>
-        <p:spPr>
-          <a:xfrm>
-            <a:off x="5012258" y="2979195"/>
-            <a:ext cx="0" cy="429180"/>
+          <a:xfrm>
+            <a:off x="5071134" y="4076417"/>
+            <a:ext cx="6287" cy="299023"/>
           </a:xfrm>
           <a:prstGeom prst="straightConnector1">
             <a:avLst/>
@@ -6149,7 +6843,44 @@
         </p:nvCxnSpPr>
         <p:spPr>
           <a:xfrm>
-            <a:off x="3863303" y="2989698"/>
+            <a:off x="5068537" y="3199414"/>
+            <a:ext cx="0" cy="429180"/>
+          </a:xfrm>
+          <a:prstGeom prst="straightConnector1">
+            <a:avLst/>
+          </a:prstGeom>
+          <a:ln>
+            <a:solidFill>
+              <a:srgbClr val="000000"/>
+            </a:solidFill>
+            <a:headEnd type="arrow"/>
+            <a:tailEnd type="arrow"/>
+          </a:ln>
+        </p:spPr>
+        <p:style>
+          <a:lnRef idx="2">
+            <a:schemeClr val="accent1"/>
+          </a:lnRef>
+          <a:fillRef idx="0">
+            <a:schemeClr val="accent1"/>
+          </a:fillRef>
+          <a:effectRef idx="1">
+            <a:schemeClr val="accent1"/>
+          </a:effectRef>
+          <a:fontRef idx="minor">
+            <a:schemeClr val="tx1"/>
+          </a:fontRef>
+        </p:style>
+      </p:cxnSp>
+      <p:cxnSp>
+        <p:nvCxnSpPr>
+          <p:cNvPr id="50" name="Straight Arrow Connector 49"/>
+          <p:cNvCxnSpPr/>
+          <p:nvPr/>
+        </p:nvCxnSpPr>
+        <p:spPr>
+          <a:xfrm>
+            <a:off x="3891048" y="3199414"/>
             <a:ext cx="0" cy="429180"/>
           </a:xfrm>
           <a:prstGeom prst="straightConnector1">
@@ -6181,7 +6912,7 @@
     </p:spTree>
     <p:extLst>
       <p:ext uri="{BB962C8B-B14F-4D97-AF65-F5344CB8AC3E}">
-        <p14:creationId xmlns:p14="http://schemas.microsoft.com/office/powerpoint/2010/main" val="4079123327"/>
+        <p14:creationId xmlns:p14="http://schemas.microsoft.com/office/powerpoint/2010/main" val="584128161"/>
       </p:ext>
     </p:extLst>
   </p:cSld>
@@ -6225,6 +6956,475 @@
           <a:p>
             <a:r>
               <a:rPr lang="en-US"/>
+              <a:t>Scripting Client</a:t>
+            </a:r>
+          </a:p>
+        </p:txBody>
+      </p:sp>
+      <p:sp>
+        <p:nvSpPr>
+          <p:cNvPr id="6" name="Rectangle 5"/>
+          <p:cNvSpPr/>
+          <p:nvPr/>
+        </p:nvSpPr>
+        <p:spPr>
+          <a:xfrm>
+            <a:off x="3338950" y="2341827"/>
+            <a:ext cx="2145828" cy="637368"/>
+          </a:xfrm>
+          <a:prstGeom prst="rect">
+            <a:avLst/>
+          </a:prstGeom>
+          <a:solidFill>
+            <a:schemeClr val="accent6">
+              <a:lumMod val="40000"/>
+              <a:lumOff val="60000"/>
+            </a:schemeClr>
+          </a:solidFill>
+          <a:ln>
+            <a:solidFill>
+              <a:schemeClr val="tx1"/>
+            </a:solidFill>
+          </a:ln>
+        </p:spPr>
+        <p:style>
+          <a:lnRef idx="1">
+            <a:schemeClr val="accent1"/>
+          </a:lnRef>
+          <a:fillRef idx="3">
+            <a:schemeClr val="accent1"/>
+          </a:fillRef>
+          <a:effectRef idx="2">
+            <a:schemeClr val="accent1"/>
+          </a:effectRef>
+          <a:fontRef idx="minor">
+            <a:schemeClr val="lt1"/>
+          </a:fontRef>
+        </p:style>
+        <p:txBody>
+          <a:bodyPr rtlCol="0" anchor="ctr"/>
+          <a:lstStyle/>
+          <a:p>
+            <a:pPr algn="ctr"/>
+            <a:r>
+              <a:rPr lang="en-US">
+                <a:solidFill>
+                  <a:srgbClr val="000000"/>
+                </a:solidFill>
+              </a:rPr>
+              <a:t>Abstract Transfer Layer</a:t>
+            </a:r>
+          </a:p>
+        </p:txBody>
+      </p:sp>
+      <p:sp>
+        <p:nvSpPr>
+          <p:cNvPr id="14" name="Rectangle 13"/>
+          <p:cNvSpPr/>
+          <p:nvPr/>
+        </p:nvSpPr>
+        <p:spPr>
+          <a:xfrm>
+            <a:off x="3338950" y="3412397"/>
+            <a:ext cx="1053900" cy="454304"/>
+          </a:xfrm>
+          <a:prstGeom prst="rect">
+            <a:avLst/>
+          </a:prstGeom>
+          <a:solidFill>
+            <a:srgbClr val="FCD5B5"/>
+          </a:solidFill>
+          <a:ln>
+            <a:solidFill>
+              <a:schemeClr val="tx1"/>
+            </a:solidFill>
+          </a:ln>
+        </p:spPr>
+        <p:style>
+          <a:lnRef idx="1">
+            <a:schemeClr val="accent1"/>
+          </a:lnRef>
+          <a:fillRef idx="3">
+            <a:schemeClr val="accent1"/>
+          </a:fillRef>
+          <a:effectRef idx="2">
+            <a:schemeClr val="accent1"/>
+          </a:effectRef>
+          <a:fontRef idx="minor">
+            <a:schemeClr val="lt1"/>
+          </a:fontRef>
+        </p:style>
+        <p:txBody>
+          <a:bodyPr rtlCol="0" anchor="ctr"/>
+          <a:lstStyle/>
+          <a:p>
+            <a:pPr algn="ctr"/>
+            <a:r>
+              <a:rPr lang="en-US">
+                <a:solidFill>
+                  <a:srgbClr val="000000"/>
+                </a:solidFill>
+              </a:rPr>
+              <a:t>Protocols</a:t>
+            </a:r>
+          </a:p>
+        </p:txBody>
+      </p:sp>
+      <p:sp>
+        <p:nvSpPr>
+          <p:cNvPr id="42" name="Cloud 41"/>
+          <p:cNvSpPr/>
+          <p:nvPr/>
+        </p:nvSpPr>
+        <p:spPr>
+          <a:xfrm>
+            <a:off x="3227637" y="4120753"/>
+            <a:ext cx="1265795" cy="1168745"/>
+          </a:xfrm>
+          <a:prstGeom prst="cloud">
+            <a:avLst/>
+          </a:prstGeom>
+          <a:solidFill>
+            <a:srgbClr val="FFFFFF"/>
+          </a:solidFill>
+          <a:ln>
+            <a:solidFill>
+              <a:srgbClr val="000000"/>
+            </a:solidFill>
+          </a:ln>
+        </p:spPr>
+        <p:style>
+          <a:lnRef idx="1">
+            <a:schemeClr val="accent1"/>
+          </a:lnRef>
+          <a:fillRef idx="3">
+            <a:schemeClr val="accent1"/>
+          </a:fillRef>
+          <a:effectRef idx="2">
+            <a:schemeClr val="accent1"/>
+          </a:effectRef>
+          <a:fontRef idx="minor">
+            <a:schemeClr val="lt1"/>
+          </a:fontRef>
+        </p:style>
+        <p:txBody>
+          <a:bodyPr rtlCol="0" anchor="ctr"/>
+          <a:lstStyle/>
+          <a:p>
+            <a:pPr algn="ctr"/>
+            <a:r>
+              <a:rPr lang="en-US">
+                <a:solidFill>
+                  <a:srgbClr val="000000"/>
+                </a:solidFill>
+              </a:rPr>
+              <a:t>HTTP, CoAP, MQTT</a:t>
+            </a:r>
+          </a:p>
+        </p:txBody>
+      </p:sp>
+      <p:sp>
+        <p:nvSpPr>
+          <p:cNvPr id="27" name="Rectangle 26"/>
+          <p:cNvSpPr/>
+          <p:nvPr/>
+        </p:nvSpPr>
+        <p:spPr>
+          <a:xfrm>
+            <a:off x="4516736" y="3418878"/>
+            <a:ext cx="968042" cy="454304"/>
+          </a:xfrm>
+          <a:prstGeom prst="rect">
+            <a:avLst/>
+          </a:prstGeom>
+          <a:solidFill>
+            <a:srgbClr val="FCD5B5"/>
+          </a:solidFill>
+          <a:ln>
+            <a:solidFill>
+              <a:schemeClr val="tx1"/>
+            </a:solidFill>
+          </a:ln>
+        </p:spPr>
+        <p:style>
+          <a:lnRef idx="1">
+            <a:schemeClr val="accent1"/>
+          </a:lnRef>
+          <a:fillRef idx="3">
+            <a:schemeClr val="accent1"/>
+          </a:fillRef>
+          <a:effectRef idx="2">
+            <a:schemeClr val="accent1"/>
+          </a:effectRef>
+          <a:fontRef idx="minor">
+            <a:schemeClr val="lt1"/>
+          </a:fontRef>
+        </p:style>
+        <p:txBody>
+          <a:bodyPr rtlCol="0" anchor="ctr"/>
+          <a:lstStyle/>
+          <a:p>
+            <a:pPr algn="ctr"/>
+            <a:r>
+              <a:rPr lang="en-US">
+                <a:solidFill>
+                  <a:srgbClr val="000000"/>
+                </a:solidFill>
+              </a:rPr>
+              <a:t>API</a:t>
+            </a:r>
+          </a:p>
+        </p:txBody>
+      </p:sp>
+      <p:cxnSp>
+        <p:nvCxnSpPr>
+          <p:cNvPr id="39" name="Straight Arrow Connector 38"/>
+          <p:cNvCxnSpPr>
+            <a:stCxn id="14" idx="2"/>
+            <a:endCxn id="42" idx="3"/>
+          </p:cNvCxnSpPr>
+          <p:nvPr/>
+        </p:nvCxnSpPr>
+        <p:spPr>
+          <a:xfrm flipH="1">
+            <a:off x="3860535" y="3866701"/>
+            <a:ext cx="5365" cy="320876"/>
+          </a:xfrm>
+          <a:prstGeom prst="straightConnector1">
+            <a:avLst/>
+          </a:prstGeom>
+          <a:ln>
+            <a:solidFill>
+              <a:srgbClr val="000000"/>
+            </a:solidFill>
+            <a:headEnd type="arrow"/>
+            <a:tailEnd type="arrow"/>
+          </a:ln>
+        </p:spPr>
+        <p:style>
+          <a:lnRef idx="2">
+            <a:schemeClr val="accent1"/>
+          </a:lnRef>
+          <a:fillRef idx="0">
+            <a:schemeClr val="accent1"/>
+          </a:fillRef>
+          <a:effectRef idx="1">
+            <a:schemeClr val="accent1"/>
+          </a:effectRef>
+          <a:fontRef idx="minor">
+            <a:schemeClr val="tx1"/>
+          </a:fontRef>
+        </p:style>
+      </p:cxnSp>
+      <p:sp>
+        <p:nvSpPr>
+          <p:cNvPr id="32" name="Multidocument 31"/>
+          <p:cNvSpPr/>
+          <p:nvPr/>
+        </p:nvSpPr>
+        <p:spPr>
+          <a:xfrm>
+            <a:off x="4583278" y="4229270"/>
+            <a:ext cx="963132" cy="974848"/>
+          </a:xfrm>
+          <a:prstGeom prst="flowChartMultidocument">
+            <a:avLst/>
+          </a:prstGeom>
+          <a:noFill/>
+          <a:ln>
+            <a:solidFill>
+              <a:srgbClr val="000000"/>
+            </a:solidFill>
+          </a:ln>
+        </p:spPr>
+        <p:style>
+          <a:lnRef idx="1">
+            <a:schemeClr val="accent1"/>
+          </a:lnRef>
+          <a:fillRef idx="3">
+            <a:schemeClr val="accent1"/>
+          </a:fillRef>
+          <a:effectRef idx="2">
+            <a:schemeClr val="accent1"/>
+          </a:effectRef>
+          <a:fontRef idx="minor">
+            <a:schemeClr val="lt1"/>
+          </a:fontRef>
+        </p:style>
+        <p:txBody>
+          <a:bodyPr rtlCol="0" anchor="ctr"/>
+          <a:lstStyle/>
+          <a:p>
+            <a:pPr algn="ctr"/>
+            <a:r>
+              <a:rPr lang="en-US">
+                <a:solidFill>
+                  <a:srgbClr val="000000"/>
+                </a:solidFill>
+              </a:rPr>
+              <a:t>Scripts</a:t>
+            </a:r>
+          </a:p>
+        </p:txBody>
+      </p:sp>
+      <p:cxnSp>
+        <p:nvCxnSpPr>
+          <p:cNvPr id="40" name="Straight Arrow Connector 39"/>
+          <p:cNvCxnSpPr/>
+          <p:nvPr/>
+        </p:nvCxnSpPr>
+        <p:spPr>
+          <a:xfrm>
+            <a:off x="5012258" y="3877536"/>
+            <a:ext cx="0" cy="351734"/>
+          </a:xfrm>
+          <a:prstGeom prst="straightConnector1">
+            <a:avLst/>
+          </a:prstGeom>
+          <a:ln>
+            <a:solidFill>
+              <a:srgbClr val="000000"/>
+            </a:solidFill>
+            <a:headEnd type="arrow"/>
+            <a:tailEnd type="arrow"/>
+          </a:ln>
+        </p:spPr>
+        <p:style>
+          <a:lnRef idx="2">
+            <a:schemeClr val="accent1"/>
+          </a:lnRef>
+          <a:fillRef idx="0">
+            <a:schemeClr val="accent1"/>
+          </a:fillRef>
+          <a:effectRef idx="1">
+            <a:schemeClr val="accent1"/>
+          </a:effectRef>
+          <a:fontRef idx="minor">
+            <a:schemeClr val="tx1"/>
+          </a:fontRef>
+        </p:style>
+      </p:cxnSp>
+      <p:cxnSp>
+        <p:nvCxnSpPr>
+          <p:cNvPr id="47" name="Straight Arrow Connector 46"/>
+          <p:cNvCxnSpPr/>
+          <p:nvPr/>
+        </p:nvCxnSpPr>
+        <p:spPr>
+          <a:xfrm>
+            <a:off x="5012258" y="2979195"/>
+            <a:ext cx="0" cy="429180"/>
+          </a:xfrm>
+          <a:prstGeom prst="straightConnector1">
+            <a:avLst/>
+          </a:prstGeom>
+          <a:ln>
+            <a:solidFill>
+              <a:srgbClr val="000000"/>
+            </a:solidFill>
+            <a:headEnd type="arrow"/>
+            <a:tailEnd type="arrow"/>
+          </a:ln>
+        </p:spPr>
+        <p:style>
+          <a:lnRef idx="2">
+            <a:schemeClr val="accent1"/>
+          </a:lnRef>
+          <a:fillRef idx="0">
+            <a:schemeClr val="accent1"/>
+          </a:fillRef>
+          <a:effectRef idx="1">
+            <a:schemeClr val="accent1"/>
+          </a:effectRef>
+          <a:fontRef idx="minor">
+            <a:schemeClr val="tx1"/>
+          </a:fontRef>
+        </p:style>
+      </p:cxnSp>
+      <p:cxnSp>
+        <p:nvCxnSpPr>
+          <p:cNvPr id="49" name="Straight Arrow Connector 48"/>
+          <p:cNvCxnSpPr/>
+          <p:nvPr/>
+        </p:nvCxnSpPr>
+        <p:spPr>
+          <a:xfrm>
+            <a:off x="3863303" y="2989698"/>
+            <a:ext cx="0" cy="429180"/>
+          </a:xfrm>
+          <a:prstGeom prst="straightConnector1">
+            <a:avLst/>
+          </a:prstGeom>
+          <a:ln>
+            <a:solidFill>
+              <a:srgbClr val="000000"/>
+            </a:solidFill>
+            <a:headEnd type="arrow"/>
+            <a:tailEnd type="arrow"/>
+          </a:ln>
+        </p:spPr>
+        <p:style>
+          <a:lnRef idx="2">
+            <a:schemeClr val="accent1"/>
+          </a:lnRef>
+          <a:fillRef idx="0">
+            <a:schemeClr val="accent1"/>
+          </a:fillRef>
+          <a:effectRef idx="1">
+            <a:schemeClr val="accent1"/>
+          </a:effectRef>
+          <a:fontRef idx="minor">
+            <a:schemeClr val="tx1"/>
+          </a:fontRef>
+        </p:style>
+      </p:cxnSp>
+    </p:spTree>
+    <p:extLst>
+      <p:ext uri="{BB962C8B-B14F-4D97-AF65-F5344CB8AC3E}">
+        <p14:creationId xmlns:p14="http://schemas.microsoft.com/office/powerpoint/2010/main" val="4079123327"/>
+      </p:ext>
+    </p:extLst>
+  </p:cSld>
+  <p:clrMapOvr>
+    <a:masterClrMapping/>
+  </p:clrMapOvr>
+</p:sld>
+</file>
+
+<file path=ppt/slides/slide15.xml><?xml version="1.0" encoding="utf-8"?>
+<p:sld xmlns:a="http://schemas.openxmlformats.org/drawingml/2006/main" xmlns:r="http://schemas.openxmlformats.org/officeDocument/2006/relationships" xmlns:p="http://schemas.openxmlformats.org/presentationml/2006/main">
+  <p:cSld>
+    <p:spTree>
+      <p:nvGrpSpPr>
+        <p:cNvPr id="1" name=""/>
+        <p:cNvGrpSpPr/>
+        <p:nvPr/>
+      </p:nvGrpSpPr>
+      <p:grpSpPr>
+        <a:xfrm>
+          <a:off x="0" y="0"/>
+          <a:ext cx="0" cy="0"/>
+          <a:chOff x="0" y="0"/>
+          <a:chExt cx="0" cy="0"/>
+        </a:xfrm>
+      </p:grpSpPr>
+      <p:sp>
+        <p:nvSpPr>
+          <p:cNvPr id="2" name="Title 1"/>
+          <p:cNvSpPr>
+            <a:spLocks noGrp="1"/>
+          </p:cNvSpPr>
+          <p:nvPr>
+            <p:ph type="title"/>
+          </p:nvPr>
+        </p:nvSpPr>
+        <p:spPr/>
+        <p:txBody>
+          <a:bodyPr/>
+          <a:lstStyle/>
+          <a:p>
+            <a:r>
+              <a:rPr lang="en-US"/>
               <a:t>Milestones</a:t>
             </a:r>
           </a:p>
@@ -6291,7 +7491,7 @@
 </p:sld>
 </file>
 
-<file path=ppt/slides/slide15.xml><?xml version="1.0" encoding="utf-8"?>
+<file path=ppt/slides/slide16.xml><?xml version="1.0" encoding="utf-8"?>
 <p:sld xmlns:a="http://schemas.openxmlformats.org/drawingml/2006/main" xmlns:r="http://schemas.openxmlformats.org/officeDocument/2006/relationships" xmlns:p="http://schemas.openxmlformats.org/presentationml/2006/main">
   <p:cSld>
     <p:spTree>
@@ -6455,19 +7655,7 @@
           <a:p>
             <a:r>
               <a:rPr lang="en-US"/>
-              <a:t>Implementation of WoT Web Interface, </a:t>
-            </a:r>
-            <a:r>
-              <a:rPr lang="en-US"/>
-              <a:t>Abstract </a:t>
-            </a:r>
-            <a:r>
-              <a:rPr lang="en-US"/>
-              <a:t>Transfer Layer and </a:t>
-            </a:r>
-            <a:r>
-              <a:rPr lang="en-US"/>
-              <a:t>Common Resource Model </a:t>
+              <a:t>Implementation of WoT Web Interface, Abstract Transfer Layer and Common Resource Model </a:t>
             </a:r>
           </a:p>
           <a:p>
@@ -7109,7 +8297,6 @@
               <a:rPr lang="en-US"/>
               <a:t>Servient</a:t>
             </a:r>
-            <a:endParaRPr lang="en-US"/>
           </a:p>
         </p:txBody>
       </p:sp>
@@ -8673,7 +9860,6 @@
               <a:rPr lang="en-US" sz="1600"/>
               <a:t>Property href</a:t>
             </a:r>
-            <a:endParaRPr lang="en-US" sz="1600"/>
           </a:p>
         </p:txBody>
       </p:sp>
@@ -8702,7 +9888,6 @@
               <a:rPr lang="en-US" sz="1600"/>
               <a:t>Property href</a:t>
             </a:r>
-            <a:endParaRPr lang="en-US" sz="1600"/>
           </a:p>
         </p:txBody>
       </p:sp>
@@ -8731,7 +9916,6 @@
               <a:rPr lang="en-US" sz="1600"/>
               <a:t>Action href</a:t>
             </a:r>
-            <a:endParaRPr lang="en-US" sz="1600"/>
           </a:p>
         </p:txBody>
       </p:sp>
@@ -8760,7 +9944,6 @@
               <a:rPr lang="en-US" sz="1600"/>
               <a:t>Event href</a:t>
             </a:r>
-            <a:endParaRPr lang="en-US" sz="1600"/>
           </a:p>
         </p:txBody>
       </p:sp>
@@ -8789,7 +9972,6 @@
               <a:rPr lang="en-US"/>
               <a:t>Property</a:t>
             </a:r>
-            <a:endParaRPr lang="en-US"/>
           </a:p>
         </p:txBody>
       </p:sp>
@@ -8818,7 +10000,6 @@
               <a:rPr lang="en-US"/>
               <a:t>Property</a:t>
             </a:r>
-            <a:endParaRPr lang="en-US"/>
           </a:p>
         </p:txBody>
       </p:sp>
@@ -8847,7 +10028,6 @@
               <a:rPr lang="en-US"/>
               <a:t>Actuations</a:t>
             </a:r>
-            <a:endParaRPr lang="en-US"/>
           </a:p>
         </p:txBody>
       </p:sp>
@@ -8876,7 +10056,6 @@
               <a:rPr lang="en-US"/>
               <a:t>Subscriptions</a:t>
             </a:r>
-            <a:endParaRPr lang="en-US"/>
           </a:p>
         </p:txBody>
       </p:sp>
@@ -8951,7 +10130,6 @@
               <a:rPr lang="en-US"/>
               <a:t>Resource Model</a:t>
             </a:r>
-            <a:endParaRPr lang="en-US"/>
           </a:p>
         </p:txBody>
       </p:sp>

</xml_diff>